<commit_message>
added legal mentions | credits | confidentiality and readme.md
</commit_message>
<xml_diff>
--- a/server/public/images/icons_template.pptx
+++ b/server/public/images/icons_template.pptx
@@ -5,26 +5,31 @@
     <p:sldMasterId id="2147483648" r:id="rId1"/>
   </p:sldMasterIdLst>
   <p:notesMasterIdLst>
-    <p:notesMasterId r:id="rId19"/>
+    <p:notesMasterId r:id="rId24"/>
   </p:notesMasterIdLst>
   <p:sldIdLst>
     <p:sldId id="267" r:id="rId2"/>
-    <p:sldId id="273" r:id="rId3"/>
-    <p:sldId id="272" r:id="rId4"/>
-    <p:sldId id="268" r:id="rId5"/>
-    <p:sldId id="269" r:id="rId6"/>
-    <p:sldId id="270" r:id="rId7"/>
-    <p:sldId id="271" r:id="rId8"/>
-    <p:sldId id="258" r:id="rId9"/>
-    <p:sldId id="259" r:id="rId10"/>
-    <p:sldId id="260" r:id="rId11"/>
-    <p:sldId id="261" r:id="rId12"/>
-    <p:sldId id="262" r:id="rId13"/>
-    <p:sldId id="274" r:id="rId14"/>
-    <p:sldId id="263" r:id="rId15"/>
-    <p:sldId id="264" r:id="rId16"/>
-    <p:sldId id="265" r:id="rId17"/>
-    <p:sldId id="266" r:id="rId18"/>
+    <p:sldId id="275" r:id="rId3"/>
+    <p:sldId id="276" r:id="rId4"/>
+    <p:sldId id="277" r:id="rId5"/>
+    <p:sldId id="278" r:id="rId6"/>
+    <p:sldId id="279" r:id="rId7"/>
+    <p:sldId id="273" r:id="rId8"/>
+    <p:sldId id="272" r:id="rId9"/>
+    <p:sldId id="268" r:id="rId10"/>
+    <p:sldId id="269" r:id="rId11"/>
+    <p:sldId id="270" r:id="rId12"/>
+    <p:sldId id="271" r:id="rId13"/>
+    <p:sldId id="258" r:id="rId14"/>
+    <p:sldId id="259" r:id="rId15"/>
+    <p:sldId id="260" r:id="rId16"/>
+    <p:sldId id="261" r:id="rId17"/>
+    <p:sldId id="262" r:id="rId18"/>
+    <p:sldId id="274" r:id="rId19"/>
+    <p:sldId id="263" r:id="rId20"/>
+    <p:sldId id="264" r:id="rId21"/>
+    <p:sldId id="265" r:id="rId22"/>
+    <p:sldId id="266" r:id="rId23"/>
   </p:sldIdLst>
   <p:sldSz cx="12192000" cy="6858000"/>
   <p:notesSz cx="6858000" cy="9144000"/>
@@ -224,7 +229,7 @@
           <a:p>
             <a:fld id="{4DCFF347-C964-E14A-9C03-BF08E4FB392F}" type="datetimeFigureOut">
               <a:rPr lang="en-US" smtClean="0"/>
-              <a:t>5/13/20</a:t>
+              <a:t>5/17/20</a:t>
             </a:fld>
             <a:endParaRPr lang="en-US"/>
           </a:p>
@@ -557,7 +562,7 @@
           <a:p>
             <a:fld id="{087E5C1D-944B-9544-97FA-575E8155EEAE}" type="slidenum">
               <a:rPr lang="en-US" smtClean="0"/>
-              <a:t>6</a:t>
+              <a:t>11</a:t>
             </a:fld>
             <a:endParaRPr lang="en-US"/>
           </a:p>
@@ -725,7 +730,7 @@
           <a:p>
             <a:fld id="{93A6170A-6421-7449-AF07-79400B158FF8}" type="datetimeFigureOut">
               <a:rPr lang="en-US" smtClean="0"/>
-              <a:t>5/13/20</a:t>
+              <a:t>5/17/20</a:t>
             </a:fld>
             <a:endParaRPr lang="en-US"/>
           </a:p>
@@ -925,7 +930,7 @@
           <a:p>
             <a:fld id="{93A6170A-6421-7449-AF07-79400B158FF8}" type="datetimeFigureOut">
               <a:rPr lang="en-US" smtClean="0"/>
-              <a:t>5/13/20</a:t>
+              <a:t>5/17/20</a:t>
             </a:fld>
             <a:endParaRPr lang="en-US"/>
           </a:p>
@@ -1135,7 +1140,7 @@
           <a:p>
             <a:fld id="{93A6170A-6421-7449-AF07-79400B158FF8}" type="datetimeFigureOut">
               <a:rPr lang="en-US" smtClean="0"/>
-              <a:t>5/13/20</a:t>
+              <a:t>5/17/20</a:t>
             </a:fld>
             <a:endParaRPr lang="en-US"/>
           </a:p>
@@ -1335,7 +1340,7 @@
           <a:p>
             <a:fld id="{93A6170A-6421-7449-AF07-79400B158FF8}" type="datetimeFigureOut">
               <a:rPr lang="en-US" smtClean="0"/>
-              <a:t>5/13/20</a:t>
+              <a:t>5/17/20</a:t>
             </a:fld>
             <a:endParaRPr lang="en-US"/>
           </a:p>
@@ -1611,7 +1616,7 @@
           <a:p>
             <a:fld id="{93A6170A-6421-7449-AF07-79400B158FF8}" type="datetimeFigureOut">
               <a:rPr lang="en-US" smtClean="0"/>
-              <a:t>5/13/20</a:t>
+              <a:t>5/17/20</a:t>
             </a:fld>
             <a:endParaRPr lang="en-US"/>
           </a:p>
@@ -1879,7 +1884,7 @@
           <a:p>
             <a:fld id="{93A6170A-6421-7449-AF07-79400B158FF8}" type="datetimeFigureOut">
               <a:rPr lang="en-US" smtClean="0"/>
-              <a:t>5/13/20</a:t>
+              <a:t>5/17/20</a:t>
             </a:fld>
             <a:endParaRPr lang="en-US"/>
           </a:p>
@@ -2294,7 +2299,7 @@
           <a:p>
             <a:fld id="{93A6170A-6421-7449-AF07-79400B158FF8}" type="datetimeFigureOut">
               <a:rPr lang="en-US" smtClean="0"/>
-              <a:t>5/13/20</a:t>
+              <a:t>5/17/20</a:t>
             </a:fld>
             <a:endParaRPr lang="en-US"/>
           </a:p>
@@ -2436,7 +2441,7 @@
           <a:p>
             <a:fld id="{93A6170A-6421-7449-AF07-79400B158FF8}" type="datetimeFigureOut">
               <a:rPr lang="en-US" smtClean="0"/>
-              <a:t>5/13/20</a:t>
+              <a:t>5/17/20</a:t>
             </a:fld>
             <a:endParaRPr lang="en-US"/>
           </a:p>
@@ -2549,7 +2554,7 @@
           <a:p>
             <a:fld id="{93A6170A-6421-7449-AF07-79400B158FF8}" type="datetimeFigureOut">
               <a:rPr lang="en-US" smtClean="0"/>
-              <a:t>5/13/20</a:t>
+              <a:t>5/17/20</a:t>
             </a:fld>
             <a:endParaRPr lang="en-US"/>
           </a:p>
@@ -2862,7 +2867,7 @@
           <a:p>
             <a:fld id="{93A6170A-6421-7449-AF07-79400B158FF8}" type="datetimeFigureOut">
               <a:rPr lang="en-US" smtClean="0"/>
-              <a:t>5/13/20</a:t>
+              <a:t>5/17/20</a:t>
             </a:fld>
             <a:endParaRPr lang="en-US"/>
           </a:p>
@@ -3151,7 +3156,7 @@
           <a:p>
             <a:fld id="{93A6170A-6421-7449-AF07-79400B158FF8}" type="datetimeFigureOut">
               <a:rPr lang="en-US" smtClean="0"/>
-              <a:t>5/13/20</a:t>
+              <a:t>5/17/20</a:t>
             </a:fld>
             <a:endParaRPr lang="en-US"/>
           </a:p>
@@ -3394,7 +3399,7 @@
           <a:p>
             <a:fld id="{93A6170A-6421-7449-AF07-79400B158FF8}" type="datetimeFigureOut">
               <a:rPr lang="en-US" smtClean="0"/>
-              <a:t>5/13/20</a:t>
+              <a:t>5/17/20</a:t>
             </a:fld>
             <a:endParaRPr lang="en-US"/>
           </a:p>
@@ -3963,8 +3968,10 @@
           <a:solidFill>
             <a:srgbClr val="6E9624"/>
           </a:solidFill>
-          <a:ln>
-            <a:noFill/>
+          <a:ln w="203200">
+            <a:solidFill>
+              <a:schemeClr val="accent4"/>
+            </a:solidFill>
           </a:ln>
         </p:spPr>
         <p:style>
@@ -4013,7 +4020,7 @@
         <p:spPr>
           <a:xfrm>
             <a:off x="524932" y="5953017"/>
-            <a:ext cx="2386433" cy="369332"/>
+            <a:ext cx="2892231" cy="369332"/>
           </a:xfrm>
           <a:prstGeom prst="rect">
             <a:avLst/>
@@ -4028,73 +4035,19 @@
           <a:p>
             <a:r>
               <a:rPr lang="en-US" dirty="0" err="1"/>
-              <a:t>Green_with_spot</a:t>
+              <a:t>Green_with_border</a:t>
             </a:r>
             <a:r>
               <a:rPr lang="en-US" dirty="0"/>
               <a:t> _50</a:t>
             </a:r>
-          </a:p>
-        </p:txBody>
-      </p:sp>
-      <p:sp>
-        <p:nvSpPr>
-          <p:cNvPr id="8" name="Oval 7">
-            <a:extLst>
-              <a:ext uri="{FF2B5EF4-FFF2-40B4-BE49-F238E27FC236}">
-                <a16:creationId xmlns:a16="http://schemas.microsoft.com/office/drawing/2014/main" id="{B297334D-6CC5-0241-825E-DBE83A2FB936}"/>
-              </a:ext>
-            </a:extLst>
-          </p:cNvPr>
-          <p:cNvSpPr/>
-          <p:nvPr/>
-        </p:nvSpPr>
-        <p:spPr>
-          <a:xfrm>
-            <a:off x="4659537" y="2485623"/>
-            <a:ext cx="1908687" cy="1893194"/>
-          </a:xfrm>
-          <a:prstGeom prst="ellipse">
-            <a:avLst/>
-          </a:prstGeom>
-          <a:solidFill>
-            <a:schemeClr val="bg2">
-              <a:alpha val="10000"/>
-            </a:schemeClr>
-          </a:solidFill>
-          <a:ln>
-            <a:noFill/>
-          </a:ln>
-        </p:spPr>
-        <p:style>
-          <a:lnRef idx="2">
-            <a:schemeClr val="accent1">
-              <a:shade val="50000"/>
-            </a:schemeClr>
-          </a:lnRef>
-          <a:fillRef idx="1">
-            <a:schemeClr val="accent1"/>
-          </a:fillRef>
-          <a:effectRef idx="0">
-            <a:schemeClr val="accent1"/>
-          </a:effectRef>
-          <a:fontRef idx="minor">
-            <a:schemeClr val="lt1"/>
-          </a:fontRef>
-        </p:style>
-        <p:txBody>
-          <a:bodyPr rtlCol="0" anchor="ctr"/>
-          <a:lstStyle/>
-          <a:p>
-            <a:pPr algn="ctr"/>
-            <a:endParaRPr lang="en-US"/>
           </a:p>
         </p:txBody>
       </p:sp>
     </p:spTree>
     <p:extLst>
       <p:ext uri="{BB962C8B-B14F-4D97-AF65-F5344CB8AC3E}">
-        <p14:creationId xmlns:p14="http://schemas.microsoft.com/office/powerpoint/2010/main" val="1003806298"/>
+        <p14:creationId xmlns:p14="http://schemas.microsoft.com/office/powerpoint/2010/main" val="3694608347"/>
       </p:ext>
     </p:extLst>
   </p:cSld>
@@ -4146,8 +4099,10 @@
           <a:solidFill>
             <a:srgbClr val="67B946"/>
           </a:solidFill>
-          <a:ln>
-            <a:noFill/>
+          <a:ln w="203200">
+            <a:solidFill>
+              <a:schemeClr val="accent4"/>
+            </a:solidFill>
           </a:ln>
         </p:spPr>
         <p:style>
@@ -4196,7 +4151,7 @@
         <p:spPr>
           <a:xfrm>
             <a:off x="524932" y="5953017"/>
-            <a:ext cx="2892231" cy="369332"/>
+            <a:ext cx="3031067" cy="369332"/>
           </a:xfrm>
           <a:prstGeom prst="rect">
             <a:avLst/>
@@ -4211,73 +4166,19 @@
           <a:p>
             <a:r>
               <a:rPr lang="en-US" dirty="0" err="1"/>
-              <a:t>Green_with_spot</a:t>
+              <a:t>Green_with_border</a:t>
             </a:r>
             <a:r>
               <a:rPr lang="en-US" dirty="0"/>
               <a:t> _25</a:t>
             </a:r>
-          </a:p>
-        </p:txBody>
-      </p:sp>
-      <p:sp>
-        <p:nvSpPr>
-          <p:cNvPr id="8" name="Oval 7">
-            <a:extLst>
-              <a:ext uri="{FF2B5EF4-FFF2-40B4-BE49-F238E27FC236}">
-                <a16:creationId xmlns:a16="http://schemas.microsoft.com/office/drawing/2014/main" id="{AFBE8226-8ACA-5748-81AD-A9695A9FC8B9}"/>
-              </a:ext>
-            </a:extLst>
-          </p:cNvPr>
-          <p:cNvSpPr/>
-          <p:nvPr/>
-        </p:nvSpPr>
-        <p:spPr>
-          <a:xfrm>
-            <a:off x="4659537" y="2485623"/>
-            <a:ext cx="1908687" cy="1893194"/>
-          </a:xfrm>
-          <a:prstGeom prst="ellipse">
-            <a:avLst/>
-          </a:prstGeom>
-          <a:solidFill>
-            <a:schemeClr val="bg2">
-              <a:alpha val="20000"/>
-            </a:schemeClr>
-          </a:solidFill>
-          <a:ln>
-            <a:noFill/>
-          </a:ln>
-        </p:spPr>
-        <p:style>
-          <a:lnRef idx="2">
-            <a:schemeClr val="accent1">
-              <a:shade val="50000"/>
-            </a:schemeClr>
-          </a:lnRef>
-          <a:fillRef idx="1">
-            <a:schemeClr val="accent1"/>
-          </a:fillRef>
-          <a:effectRef idx="0">
-            <a:schemeClr val="accent1"/>
-          </a:effectRef>
-          <a:fontRef idx="minor">
-            <a:schemeClr val="lt1"/>
-          </a:fontRef>
-        </p:style>
-        <p:txBody>
-          <a:bodyPr rtlCol="0" anchor="ctr"/>
-          <a:lstStyle/>
-          <a:p>
-            <a:pPr algn="ctr"/>
-            <a:endParaRPr lang="en-US"/>
           </a:p>
         </p:txBody>
       </p:sp>
     </p:spTree>
     <p:extLst>
       <p:ext uri="{BB962C8B-B14F-4D97-AF65-F5344CB8AC3E}">
-        <p14:creationId xmlns:p14="http://schemas.microsoft.com/office/powerpoint/2010/main" val="400599137"/>
+        <p14:creationId xmlns:p14="http://schemas.microsoft.com/office/powerpoint/2010/main" val="13841306"/>
       </p:ext>
     </p:extLst>
   </p:cSld>
@@ -4329,8 +4230,10 @@
           <a:solidFill>
             <a:srgbClr val="C5DC68"/>
           </a:solidFill>
-          <a:ln>
-            <a:noFill/>
+          <a:ln w="203200">
+            <a:solidFill>
+              <a:schemeClr val="accent4"/>
+            </a:solidFill>
           </a:ln>
         </p:spPr>
         <p:style>
@@ -4379,7 +4282,7 @@
         <p:spPr>
           <a:xfrm>
             <a:off x="524932" y="5953017"/>
-            <a:ext cx="2260309" cy="369332"/>
+            <a:ext cx="2624667" cy="369332"/>
           </a:xfrm>
           <a:prstGeom prst="rect">
             <a:avLst/>
@@ -4394,73 +4297,19 @@
           <a:p>
             <a:r>
               <a:rPr lang="en-US" dirty="0" err="1"/>
-              <a:t>Green_with_spot</a:t>
+              <a:t>Green_with_border</a:t>
             </a:r>
             <a:r>
               <a:rPr lang="en-US" dirty="0"/>
               <a:t> _0</a:t>
             </a:r>
-          </a:p>
-        </p:txBody>
-      </p:sp>
-      <p:sp>
-        <p:nvSpPr>
-          <p:cNvPr id="7" name="Oval 6">
-            <a:extLst>
-              <a:ext uri="{FF2B5EF4-FFF2-40B4-BE49-F238E27FC236}">
-                <a16:creationId xmlns:a16="http://schemas.microsoft.com/office/drawing/2014/main" id="{B13FA89C-DB57-D748-8C59-1E7CE13EB307}"/>
-              </a:ext>
-            </a:extLst>
-          </p:cNvPr>
-          <p:cNvSpPr/>
-          <p:nvPr/>
-        </p:nvSpPr>
-        <p:spPr>
-          <a:xfrm>
-            <a:off x="4659537" y="2485623"/>
-            <a:ext cx="1908687" cy="1893194"/>
-          </a:xfrm>
-          <a:prstGeom prst="ellipse">
-            <a:avLst/>
-          </a:prstGeom>
-          <a:solidFill>
-            <a:schemeClr val="bg2">
-              <a:alpha val="30000"/>
-            </a:schemeClr>
-          </a:solidFill>
-          <a:ln>
-            <a:noFill/>
-          </a:ln>
-        </p:spPr>
-        <p:style>
-          <a:lnRef idx="2">
-            <a:schemeClr val="accent1">
-              <a:shade val="50000"/>
-            </a:schemeClr>
-          </a:lnRef>
-          <a:fillRef idx="1">
-            <a:schemeClr val="accent1"/>
-          </a:fillRef>
-          <a:effectRef idx="0">
-            <a:schemeClr val="accent1"/>
-          </a:effectRef>
-          <a:fontRef idx="minor">
-            <a:schemeClr val="lt1"/>
-          </a:fontRef>
-        </p:style>
-        <p:txBody>
-          <a:bodyPr rtlCol="0" anchor="ctr"/>
-          <a:lstStyle/>
-          <a:p>
-            <a:pPr algn="ctr"/>
-            <a:endParaRPr lang="en-US"/>
           </a:p>
         </p:txBody>
       </p:sp>
     </p:spTree>
     <p:extLst>
       <p:ext uri="{BB962C8B-B14F-4D97-AF65-F5344CB8AC3E}">
-        <p14:creationId xmlns:p14="http://schemas.microsoft.com/office/powerpoint/2010/main" val="1834447640"/>
+        <p14:creationId xmlns:p14="http://schemas.microsoft.com/office/powerpoint/2010/main" val="3243478862"/>
       </p:ext>
     </p:extLst>
   </p:cSld>
@@ -4510,11 +4359,9 @@
             </a:avLst>
           </a:prstGeom>
           <a:solidFill>
-            <a:schemeClr val="accent3">
-              <a:alpha val="80000"/>
-            </a:schemeClr>
+            <a:srgbClr val="2C6109"/>
           </a:solidFill>
-          <a:ln w="203200">
+          <a:ln>
             <a:noFill/>
           </a:ln>
         </p:spPr>
@@ -4563,8 +4410,8 @@
         </p:nvSpPr>
         <p:spPr>
           <a:xfrm>
-            <a:off x="524933" y="5953017"/>
-            <a:ext cx="3352800" cy="369332"/>
+            <a:off x="524932" y="5953017"/>
+            <a:ext cx="2453045" cy="369332"/>
           </a:xfrm>
           <a:prstGeom prst="rect">
             <a:avLst/>
@@ -4579,17 +4426,17 @@
           <a:p>
             <a:r>
               <a:rPr lang="en-US" dirty="0"/>
-              <a:t>Gray</a:t>
-            </a:r>
-          </a:p>
-        </p:txBody>
-      </p:sp>
-      <p:sp>
-        <p:nvSpPr>
-          <p:cNvPr id="5" name="Oval 4">
-            <a:extLst>
-              <a:ext uri="{FF2B5EF4-FFF2-40B4-BE49-F238E27FC236}">
-                <a16:creationId xmlns:a16="http://schemas.microsoft.com/office/drawing/2014/main" id="{D23C2DC4-B463-7B4A-B7E0-1882D472B210}"/>
+              <a:t>Green_with_spot_100</a:t>
+            </a:r>
+          </a:p>
+        </p:txBody>
+      </p:sp>
+      <p:sp>
+        <p:nvSpPr>
+          <p:cNvPr id="3" name="Oval 2">
+            <a:extLst>
+              <a:ext uri="{FF2B5EF4-FFF2-40B4-BE49-F238E27FC236}">
+                <a16:creationId xmlns:a16="http://schemas.microsoft.com/office/drawing/2014/main" id="{95F14A4A-32C9-C948-A1AC-032BEAB256FF}"/>
               </a:ext>
             </a:extLst>
           </p:cNvPr>
@@ -4606,7 +4453,7 @@
           </a:prstGeom>
           <a:solidFill>
             <a:schemeClr val="bg2">
-              <a:alpha val="30000"/>
+              <a:alpha val="10000"/>
             </a:schemeClr>
           </a:solidFill>
           <a:ln>
@@ -4641,7 +4488,7 @@
     </p:spTree>
     <p:extLst>
       <p:ext uri="{BB962C8B-B14F-4D97-AF65-F5344CB8AC3E}">
-        <p14:creationId xmlns:p14="http://schemas.microsoft.com/office/powerpoint/2010/main" val="1766476236"/>
+        <p14:creationId xmlns:p14="http://schemas.microsoft.com/office/powerpoint/2010/main" val="1215715211"/>
       </p:ext>
     </p:extLst>
   </p:cSld>
@@ -4670,45 +4517,10 @@
       </p:grpSpPr>
       <p:sp>
         <p:nvSpPr>
-          <p:cNvPr id="3" name="TextBox 2">
-            <a:extLst>
-              <a:ext uri="{FF2B5EF4-FFF2-40B4-BE49-F238E27FC236}">
-                <a16:creationId xmlns:a16="http://schemas.microsoft.com/office/drawing/2014/main" id="{5AE468E7-738F-F34C-9D40-2C578BA20F32}"/>
-              </a:ext>
-            </a:extLst>
-          </p:cNvPr>
-          <p:cNvSpPr txBox="1"/>
-          <p:nvPr/>
-        </p:nvSpPr>
-        <p:spPr>
-          <a:xfrm>
-            <a:off x="524933" y="5953017"/>
-            <a:ext cx="1320800" cy="369332"/>
-          </a:xfrm>
-          <a:prstGeom prst="rect">
-            <a:avLst/>
-          </a:prstGeom>
-          <a:noFill/>
-        </p:spPr>
-        <p:txBody>
-          <a:bodyPr wrap="square" rtlCol="0">
-            <a:spAutoFit/>
-          </a:bodyPr>
-          <a:lstStyle/>
-          <a:p>
-            <a:r>
-              <a:rPr lang="en-US" dirty="0"/>
-              <a:t>stable</a:t>
-            </a:r>
-          </a:p>
-        </p:txBody>
-      </p:sp>
-      <p:sp>
-        <p:nvSpPr>
-          <p:cNvPr id="2" name="Right Arrow 1">
-            <a:extLst>
-              <a:ext uri="{FF2B5EF4-FFF2-40B4-BE49-F238E27FC236}">
-                <a16:creationId xmlns:a16="http://schemas.microsoft.com/office/drawing/2014/main" id="{4909111E-1708-3D43-87F2-FB37F53B3180}"/>
+          <p:cNvPr id="4" name="Teardrop 3">
+            <a:extLst>
+              <a:ext uri="{FF2B5EF4-FFF2-40B4-BE49-F238E27FC236}">
+                <a16:creationId xmlns:a16="http://schemas.microsoft.com/office/drawing/2014/main" id="{C48761C1-1AC9-DC4A-9E0E-F050EE971F84}"/>
               </a:ext>
             </a:extLst>
           </p:cNvPr>
@@ -4716,18 +4528,17 @@
           <p:nvPr/>
         </p:nvSpPr>
         <p:spPr>
-          <a:xfrm>
-            <a:off x="4317999" y="1574800"/>
-            <a:ext cx="4267200" cy="2929467"/>
-          </a:xfrm>
-          <a:prstGeom prst="rightArrow">
+          <a:xfrm rot="8073567">
+            <a:off x="4046017" y="1910203"/>
+            <a:ext cx="3158524" cy="3087697"/>
+          </a:xfrm>
+          <a:prstGeom prst="teardrop">
             <a:avLst>
-              <a:gd name="adj1" fmla="val 24567"/>
-              <a:gd name="adj2" fmla="val 46328"/>
+              <a:gd name="adj" fmla="val 134119"/>
             </a:avLst>
           </a:prstGeom>
           <a:solidFill>
-            <a:srgbClr val="FF0000"/>
+            <a:srgbClr val="4D7B1B"/>
           </a:solidFill>
           <a:ln>
             <a:noFill/>
@@ -4754,6 +4565,105 @@
           <a:lstStyle/>
           <a:p>
             <a:pPr algn="ctr"/>
+            <a:endParaRPr lang="en-US" dirty="0">
+              <a:solidFill>
+                <a:schemeClr val="bg2">
+                  <a:lumMod val="25000"/>
+                </a:schemeClr>
+              </a:solidFill>
+            </a:endParaRPr>
+          </a:p>
+        </p:txBody>
+      </p:sp>
+      <p:sp>
+        <p:nvSpPr>
+          <p:cNvPr id="3" name="TextBox 2">
+            <a:extLst>
+              <a:ext uri="{FF2B5EF4-FFF2-40B4-BE49-F238E27FC236}">
+                <a16:creationId xmlns:a16="http://schemas.microsoft.com/office/drawing/2014/main" id="{B6A86C8F-8A19-6C45-BB85-0F5C83220264}"/>
+              </a:ext>
+            </a:extLst>
+          </p:cNvPr>
+          <p:cNvSpPr txBox="1"/>
+          <p:nvPr/>
+        </p:nvSpPr>
+        <p:spPr>
+          <a:xfrm>
+            <a:off x="524932" y="5953017"/>
+            <a:ext cx="2892231" cy="369332"/>
+          </a:xfrm>
+          <a:prstGeom prst="rect">
+            <a:avLst/>
+          </a:prstGeom>
+          <a:noFill/>
+        </p:spPr>
+        <p:txBody>
+          <a:bodyPr wrap="square" rtlCol="0">
+            <a:spAutoFit/>
+          </a:bodyPr>
+          <a:lstStyle/>
+          <a:p>
+            <a:r>
+              <a:rPr lang="en-US" dirty="0" err="1"/>
+              <a:t>Green_with_spot</a:t>
+            </a:r>
+            <a:r>
+              <a:rPr lang="en-US" dirty="0"/>
+              <a:t> _75</a:t>
+            </a:r>
+          </a:p>
+        </p:txBody>
+      </p:sp>
+      <p:sp>
+        <p:nvSpPr>
+          <p:cNvPr id="8" name="Oval 7">
+            <a:extLst>
+              <a:ext uri="{FF2B5EF4-FFF2-40B4-BE49-F238E27FC236}">
+                <a16:creationId xmlns:a16="http://schemas.microsoft.com/office/drawing/2014/main" id="{3BB9DC39-5C68-8A4D-A5BD-DB78063FE8E7}"/>
+              </a:ext>
+            </a:extLst>
+          </p:cNvPr>
+          <p:cNvSpPr/>
+          <p:nvPr/>
+        </p:nvSpPr>
+        <p:spPr>
+          <a:xfrm>
+            <a:off x="4659537" y="2485623"/>
+            <a:ext cx="1908687" cy="1893194"/>
+          </a:xfrm>
+          <a:prstGeom prst="ellipse">
+            <a:avLst/>
+          </a:prstGeom>
+          <a:solidFill>
+            <a:schemeClr val="bg2">
+              <a:alpha val="10000"/>
+            </a:schemeClr>
+          </a:solidFill>
+          <a:ln>
+            <a:noFill/>
+          </a:ln>
+        </p:spPr>
+        <p:style>
+          <a:lnRef idx="2">
+            <a:schemeClr val="accent1">
+              <a:shade val="50000"/>
+            </a:schemeClr>
+          </a:lnRef>
+          <a:fillRef idx="1">
+            <a:schemeClr val="accent1"/>
+          </a:fillRef>
+          <a:effectRef idx="0">
+            <a:schemeClr val="accent1"/>
+          </a:effectRef>
+          <a:fontRef idx="minor">
+            <a:schemeClr val="lt1"/>
+          </a:fontRef>
+        </p:style>
+        <p:txBody>
+          <a:bodyPr rtlCol="0" anchor="ctr"/>
+          <a:lstStyle/>
+          <a:p>
+            <a:pPr algn="ctr"/>
             <a:endParaRPr lang="en-US"/>
           </a:p>
         </p:txBody>
@@ -4761,7 +4671,7 @@
     </p:spTree>
     <p:extLst>
       <p:ext uri="{BB962C8B-B14F-4D97-AF65-F5344CB8AC3E}">
-        <p14:creationId xmlns:p14="http://schemas.microsoft.com/office/powerpoint/2010/main" val="536889346"/>
+        <p14:creationId xmlns:p14="http://schemas.microsoft.com/office/powerpoint/2010/main" val="166912252"/>
       </p:ext>
     </p:extLst>
   </p:cSld>
@@ -4790,45 +4700,10 @@
       </p:grpSpPr>
       <p:sp>
         <p:nvSpPr>
-          <p:cNvPr id="3" name="TextBox 2">
-            <a:extLst>
-              <a:ext uri="{FF2B5EF4-FFF2-40B4-BE49-F238E27FC236}">
-                <a16:creationId xmlns:a16="http://schemas.microsoft.com/office/drawing/2014/main" id="{5AE468E7-738F-F34C-9D40-2C578BA20F32}"/>
-              </a:ext>
-            </a:extLst>
-          </p:cNvPr>
-          <p:cNvSpPr txBox="1"/>
-          <p:nvPr/>
-        </p:nvSpPr>
-        <p:spPr>
-          <a:xfrm>
-            <a:off x="524933" y="5953017"/>
-            <a:ext cx="1320800" cy="369332"/>
-          </a:xfrm>
-          <a:prstGeom prst="rect">
-            <a:avLst/>
-          </a:prstGeom>
-          <a:noFill/>
-        </p:spPr>
-        <p:txBody>
-          <a:bodyPr wrap="square" rtlCol="0">
-            <a:spAutoFit/>
-          </a:bodyPr>
-          <a:lstStyle/>
-          <a:p>
-            <a:r>
-              <a:rPr lang="en-US" dirty="0"/>
-              <a:t>up</a:t>
-            </a:r>
-          </a:p>
-        </p:txBody>
-      </p:sp>
-      <p:sp>
-        <p:nvSpPr>
-          <p:cNvPr id="2" name="Right Arrow 1">
-            <a:extLst>
-              <a:ext uri="{FF2B5EF4-FFF2-40B4-BE49-F238E27FC236}">
-                <a16:creationId xmlns:a16="http://schemas.microsoft.com/office/drawing/2014/main" id="{4909111E-1708-3D43-87F2-FB37F53B3180}"/>
+          <p:cNvPr id="4" name="Teardrop 3">
+            <a:extLst>
+              <a:ext uri="{FF2B5EF4-FFF2-40B4-BE49-F238E27FC236}">
+                <a16:creationId xmlns:a16="http://schemas.microsoft.com/office/drawing/2014/main" id="{C48761C1-1AC9-DC4A-9E0E-F050EE971F84}"/>
               </a:ext>
             </a:extLst>
           </p:cNvPr>
@@ -4836,18 +4711,17 @@
           <p:nvPr/>
         </p:nvSpPr>
         <p:spPr>
-          <a:xfrm rot="18772169">
-            <a:off x="4317999" y="1574800"/>
-            <a:ext cx="4267200" cy="2929467"/>
-          </a:xfrm>
-          <a:prstGeom prst="rightArrow">
+          <a:xfrm rot="8073567">
+            <a:off x="4046017" y="1910203"/>
+            <a:ext cx="3158524" cy="3087697"/>
+          </a:xfrm>
+          <a:prstGeom prst="teardrop">
             <a:avLst>
-              <a:gd name="adj1" fmla="val 24567"/>
-              <a:gd name="adj2" fmla="val 46328"/>
+              <a:gd name="adj" fmla="val 134119"/>
             </a:avLst>
           </a:prstGeom>
           <a:solidFill>
-            <a:srgbClr val="FF0000"/>
+            <a:srgbClr val="6E9624"/>
           </a:solidFill>
           <a:ln>
             <a:noFill/>
@@ -4874,6 +4748,105 @@
           <a:lstStyle/>
           <a:p>
             <a:pPr algn="ctr"/>
+            <a:endParaRPr lang="en-US" dirty="0">
+              <a:solidFill>
+                <a:schemeClr val="bg2">
+                  <a:lumMod val="25000"/>
+                </a:schemeClr>
+              </a:solidFill>
+            </a:endParaRPr>
+          </a:p>
+        </p:txBody>
+      </p:sp>
+      <p:sp>
+        <p:nvSpPr>
+          <p:cNvPr id="3" name="TextBox 2">
+            <a:extLst>
+              <a:ext uri="{FF2B5EF4-FFF2-40B4-BE49-F238E27FC236}">
+                <a16:creationId xmlns:a16="http://schemas.microsoft.com/office/drawing/2014/main" id="{7C1F9DF5-B920-1547-8A25-F1D9B352E7FB}"/>
+              </a:ext>
+            </a:extLst>
+          </p:cNvPr>
+          <p:cNvSpPr txBox="1"/>
+          <p:nvPr/>
+        </p:nvSpPr>
+        <p:spPr>
+          <a:xfrm>
+            <a:off x="524932" y="5953017"/>
+            <a:ext cx="2386433" cy="369332"/>
+          </a:xfrm>
+          <a:prstGeom prst="rect">
+            <a:avLst/>
+          </a:prstGeom>
+          <a:noFill/>
+        </p:spPr>
+        <p:txBody>
+          <a:bodyPr wrap="square" rtlCol="0">
+            <a:spAutoFit/>
+          </a:bodyPr>
+          <a:lstStyle/>
+          <a:p>
+            <a:r>
+              <a:rPr lang="en-US" dirty="0" err="1"/>
+              <a:t>Green_with_spot</a:t>
+            </a:r>
+            <a:r>
+              <a:rPr lang="en-US" dirty="0"/>
+              <a:t> _50</a:t>
+            </a:r>
+          </a:p>
+        </p:txBody>
+      </p:sp>
+      <p:sp>
+        <p:nvSpPr>
+          <p:cNvPr id="8" name="Oval 7">
+            <a:extLst>
+              <a:ext uri="{FF2B5EF4-FFF2-40B4-BE49-F238E27FC236}">
+                <a16:creationId xmlns:a16="http://schemas.microsoft.com/office/drawing/2014/main" id="{B297334D-6CC5-0241-825E-DBE83A2FB936}"/>
+              </a:ext>
+            </a:extLst>
+          </p:cNvPr>
+          <p:cNvSpPr/>
+          <p:nvPr/>
+        </p:nvSpPr>
+        <p:spPr>
+          <a:xfrm>
+            <a:off x="4659537" y="2485623"/>
+            <a:ext cx="1908687" cy="1893194"/>
+          </a:xfrm>
+          <a:prstGeom prst="ellipse">
+            <a:avLst/>
+          </a:prstGeom>
+          <a:solidFill>
+            <a:schemeClr val="bg2">
+              <a:alpha val="10000"/>
+            </a:schemeClr>
+          </a:solidFill>
+          <a:ln>
+            <a:noFill/>
+          </a:ln>
+        </p:spPr>
+        <p:style>
+          <a:lnRef idx="2">
+            <a:schemeClr val="accent1">
+              <a:shade val="50000"/>
+            </a:schemeClr>
+          </a:lnRef>
+          <a:fillRef idx="1">
+            <a:schemeClr val="accent1"/>
+          </a:fillRef>
+          <a:effectRef idx="0">
+            <a:schemeClr val="accent1"/>
+          </a:effectRef>
+          <a:fontRef idx="minor">
+            <a:schemeClr val="lt1"/>
+          </a:fontRef>
+        </p:style>
+        <p:txBody>
+          <a:bodyPr rtlCol="0" anchor="ctr"/>
+          <a:lstStyle/>
+          <a:p>
+            <a:pPr algn="ctr"/>
             <a:endParaRPr lang="en-US"/>
           </a:p>
         </p:txBody>
@@ -4881,7 +4854,7 @@
     </p:spTree>
     <p:extLst>
       <p:ext uri="{BB962C8B-B14F-4D97-AF65-F5344CB8AC3E}">
-        <p14:creationId xmlns:p14="http://schemas.microsoft.com/office/powerpoint/2010/main" val="4058273542"/>
+        <p14:creationId xmlns:p14="http://schemas.microsoft.com/office/powerpoint/2010/main" val="1003806298"/>
       </p:ext>
     </p:extLst>
   </p:cSld>
@@ -4910,45 +4883,10 @@
       </p:grpSpPr>
       <p:sp>
         <p:nvSpPr>
-          <p:cNvPr id="3" name="TextBox 2">
-            <a:extLst>
-              <a:ext uri="{FF2B5EF4-FFF2-40B4-BE49-F238E27FC236}">
-                <a16:creationId xmlns:a16="http://schemas.microsoft.com/office/drawing/2014/main" id="{5AE468E7-738F-F34C-9D40-2C578BA20F32}"/>
-              </a:ext>
-            </a:extLst>
-          </p:cNvPr>
-          <p:cNvSpPr txBox="1"/>
-          <p:nvPr/>
-        </p:nvSpPr>
-        <p:spPr>
-          <a:xfrm>
-            <a:off x="524933" y="5953017"/>
-            <a:ext cx="1320800" cy="369332"/>
-          </a:xfrm>
-          <a:prstGeom prst="rect">
-            <a:avLst/>
-          </a:prstGeom>
-          <a:noFill/>
-        </p:spPr>
-        <p:txBody>
-          <a:bodyPr wrap="square" rtlCol="0">
-            <a:spAutoFit/>
-          </a:bodyPr>
-          <a:lstStyle/>
-          <a:p>
-            <a:r>
-              <a:rPr lang="en-US" dirty="0"/>
-              <a:t>down</a:t>
-            </a:r>
-          </a:p>
-        </p:txBody>
-      </p:sp>
-      <p:sp>
-        <p:nvSpPr>
-          <p:cNvPr id="2" name="Right Arrow 1">
-            <a:extLst>
-              <a:ext uri="{FF2B5EF4-FFF2-40B4-BE49-F238E27FC236}">
-                <a16:creationId xmlns:a16="http://schemas.microsoft.com/office/drawing/2014/main" id="{4909111E-1708-3D43-87F2-FB37F53B3180}"/>
+          <p:cNvPr id="4" name="Teardrop 3">
+            <a:extLst>
+              <a:ext uri="{FF2B5EF4-FFF2-40B4-BE49-F238E27FC236}">
+                <a16:creationId xmlns:a16="http://schemas.microsoft.com/office/drawing/2014/main" id="{C48761C1-1AC9-DC4A-9E0E-F050EE971F84}"/>
               </a:ext>
             </a:extLst>
           </p:cNvPr>
@@ -4956,18 +4894,17 @@
           <p:nvPr/>
         </p:nvSpPr>
         <p:spPr>
-          <a:xfrm rot="2833537">
-            <a:off x="4317999" y="1574800"/>
-            <a:ext cx="4267200" cy="2929467"/>
-          </a:xfrm>
-          <a:prstGeom prst="rightArrow">
+          <a:xfrm rot="8073567">
+            <a:off x="4046017" y="1910203"/>
+            <a:ext cx="3158524" cy="3087697"/>
+          </a:xfrm>
+          <a:prstGeom prst="teardrop">
             <a:avLst>
-              <a:gd name="adj1" fmla="val 24567"/>
-              <a:gd name="adj2" fmla="val 46328"/>
+              <a:gd name="adj" fmla="val 134119"/>
             </a:avLst>
           </a:prstGeom>
           <a:solidFill>
-            <a:srgbClr val="FF0000"/>
+            <a:srgbClr val="67B946"/>
           </a:solidFill>
           <a:ln>
             <a:noFill/>
@@ -4994,6 +4931,105 @@
           <a:lstStyle/>
           <a:p>
             <a:pPr algn="ctr"/>
+            <a:endParaRPr lang="en-US" dirty="0">
+              <a:solidFill>
+                <a:schemeClr val="bg2">
+                  <a:lumMod val="25000"/>
+                </a:schemeClr>
+              </a:solidFill>
+            </a:endParaRPr>
+          </a:p>
+        </p:txBody>
+      </p:sp>
+      <p:sp>
+        <p:nvSpPr>
+          <p:cNvPr id="3" name="TextBox 2">
+            <a:extLst>
+              <a:ext uri="{FF2B5EF4-FFF2-40B4-BE49-F238E27FC236}">
+                <a16:creationId xmlns:a16="http://schemas.microsoft.com/office/drawing/2014/main" id="{1C488C69-D820-1546-B381-ABC2900F4EA4}"/>
+              </a:ext>
+            </a:extLst>
+          </p:cNvPr>
+          <p:cNvSpPr txBox="1"/>
+          <p:nvPr/>
+        </p:nvSpPr>
+        <p:spPr>
+          <a:xfrm>
+            <a:off x="524932" y="5953017"/>
+            <a:ext cx="2892231" cy="369332"/>
+          </a:xfrm>
+          <a:prstGeom prst="rect">
+            <a:avLst/>
+          </a:prstGeom>
+          <a:noFill/>
+        </p:spPr>
+        <p:txBody>
+          <a:bodyPr wrap="square" rtlCol="0">
+            <a:spAutoFit/>
+          </a:bodyPr>
+          <a:lstStyle/>
+          <a:p>
+            <a:r>
+              <a:rPr lang="en-US" dirty="0" err="1"/>
+              <a:t>Green_with_spot</a:t>
+            </a:r>
+            <a:r>
+              <a:rPr lang="en-US" dirty="0"/>
+              <a:t> _25</a:t>
+            </a:r>
+          </a:p>
+        </p:txBody>
+      </p:sp>
+      <p:sp>
+        <p:nvSpPr>
+          <p:cNvPr id="8" name="Oval 7">
+            <a:extLst>
+              <a:ext uri="{FF2B5EF4-FFF2-40B4-BE49-F238E27FC236}">
+                <a16:creationId xmlns:a16="http://schemas.microsoft.com/office/drawing/2014/main" id="{AFBE8226-8ACA-5748-81AD-A9695A9FC8B9}"/>
+              </a:ext>
+            </a:extLst>
+          </p:cNvPr>
+          <p:cNvSpPr/>
+          <p:nvPr/>
+        </p:nvSpPr>
+        <p:spPr>
+          <a:xfrm>
+            <a:off x="4659537" y="2485623"/>
+            <a:ext cx="1908687" cy="1893194"/>
+          </a:xfrm>
+          <a:prstGeom prst="ellipse">
+            <a:avLst/>
+          </a:prstGeom>
+          <a:solidFill>
+            <a:schemeClr val="bg2">
+              <a:alpha val="20000"/>
+            </a:schemeClr>
+          </a:solidFill>
+          <a:ln>
+            <a:noFill/>
+          </a:ln>
+        </p:spPr>
+        <p:style>
+          <a:lnRef idx="2">
+            <a:schemeClr val="accent1">
+              <a:shade val="50000"/>
+            </a:schemeClr>
+          </a:lnRef>
+          <a:fillRef idx="1">
+            <a:schemeClr val="accent1"/>
+          </a:fillRef>
+          <a:effectRef idx="0">
+            <a:schemeClr val="accent1"/>
+          </a:effectRef>
+          <a:fontRef idx="minor">
+            <a:schemeClr val="lt1"/>
+          </a:fontRef>
+        </p:style>
+        <p:txBody>
+          <a:bodyPr rtlCol="0" anchor="ctr"/>
+          <a:lstStyle/>
+          <a:p>
+            <a:pPr algn="ctr"/>
             <a:endParaRPr lang="en-US"/>
           </a:p>
         </p:txBody>
@@ -5001,7 +5037,7 @@
     </p:spTree>
     <p:extLst>
       <p:ext uri="{BB962C8B-B14F-4D97-AF65-F5344CB8AC3E}">
-        <p14:creationId xmlns:p14="http://schemas.microsoft.com/office/powerpoint/2010/main" val="1226917232"/>
+        <p14:creationId xmlns:p14="http://schemas.microsoft.com/office/powerpoint/2010/main" val="400599137"/>
       </p:ext>
     </p:extLst>
   </p:cSld>
@@ -5028,80 +5064,6 @@
           <a:chExt cx="0" cy="0"/>
         </a:xfrm>
       </p:grpSpPr>
-      <p:pic>
-        <p:nvPicPr>
-          <p:cNvPr id="7" name="Graphic 6" descr="Leaf">
-            <a:extLst>
-              <a:ext uri="{FF2B5EF4-FFF2-40B4-BE49-F238E27FC236}">
-                <a16:creationId xmlns:a16="http://schemas.microsoft.com/office/drawing/2014/main" id="{8C056B41-EECA-5240-BE3A-1FA5DDC41657}"/>
-              </a:ext>
-            </a:extLst>
-          </p:cNvPr>
-          <p:cNvPicPr>
-            <a:picLocks noChangeAspect="1"/>
-          </p:cNvPicPr>
-          <p:nvPr/>
-        </p:nvPicPr>
-        <p:blipFill>
-          <a:blip r:embed="rId2">
-            <a:extLst>
-              <a:ext uri="{96DAC541-7B7A-43D3-8B79-37D633B846F1}">
-                <asvg:svgBlip xmlns:asvg="http://schemas.microsoft.com/office/drawing/2016/SVG/main" r:embed="rId3"/>
-              </a:ext>
-            </a:extLst>
-          </a:blip>
-          <a:stretch>
-            <a:fillRect/>
-          </a:stretch>
-        </p:blipFill>
-        <p:spPr>
-          <a:xfrm>
-            <a:off x="3843866" y="1270001"/>
-            <a:ext cx="3937000" cy="3937000"/>
-          </a:xfrm>
-          <a:prstGeom prst="rect">
-            <a:avLst/>
-          </a:prstGeom>
-        </p:spPr>
-      </p:pic>
-    </p:spTree>
-    <p:extLst>
-      <p:ext uri="{BB962C8B-B14F-4D97-AF65-F5344CB8AC3E}">
-        <p14:creationId xmlns:p14="http://schemas.microsoft.com/office/powerpoint/2010/main" val="1931095479"/>
-      </p:ext>
-    </p:extLst>
-  </p:cSld>
-  <p:clrMapOvr>
-    <a:masterClrMapping/>
-  </p:clrMapOvr>
-</p:sld>
-</file>
-
-<file path=ppt/slides/slide2.xml><?xml version="1.0" encoding="utf-8"?>
-<p:sld xmlns:a="http://schemas.openxmlformats.org/drawingml/2006/main" xmlns:r="http://schemas.openxmlformats.org/officeDocument/2006/relationships" xmlns:p="http://schemas.openxmlformats.org/presentationml/2006/main">
-  <p:cSld>
-    <p:bg>
-      <p:bgPr>
-        <a:solidFill>
-          <a:schemeClr val="bg1"/>
-        </a:solidFill>
-        <a:effectLst/>
-      </p:bgPr>
-    </p:bg>
-    <p:spTree>
-      <p:nvGrpSpPr>
-        <p:cNvPr id="1" name=""/>
-        <p:cNvGrpSpPr/>
-        <p:nvPr/>
-      </p:nvGrpSpPr>
-      <p:grpSpPr>
-        <a:xfrm>
-          <a:off x="0" y="0"/>
-          <a:ext cx="0" cy="0"/>
-          <a:chOff x="0" y="0"/>
-          <a:chExt cx="0" cy="0"/>
-        </a:xfrm>
-      </p:grpSpPr>
       <p:sp>
         <p:nvSpPr>
           <p:cNvPr id="4" name="Teardrop 3">
@@ -5125,12 +5087,10 @@
             </a:avLst>
           </a:prstGeom>
           <a:solidFill>
-            <a:schemeClr val="accent3"/>
+            <a:srgbClr val="C5DC68"/>
           </a:solidFill>
-          <a:ln w="203200">
-            <a:solidFill>
-              <a:schemeClr val="accent4"/>
-            </a:solidFill>
+          <a:ln>
+            <a:noFill/>
           </a:ln>
         </p:spPr>
         <p:style>
@@ -5166,10 +5126,10 @@
       </p:sp>
       <p:sp>
         <p:nvSpPr>
-          <p:cNvPr id="2" name="TextBox 1">
-            <a:extLst>
-              <a:ext uri="{FF2B5EF4-FFF2-40B4-BE49-F238E27FC236}">
-                <a16:creationId xmlns:a16="http://schemas.microsoft.com/office/drawing/2014/main" id="{2C7A20DD-8BC2-924B-BC90-C75D9D4F87C4}"/>
+          <p:cNvPr id="3" name="TextBox 2">
+            <a:extLst>
+              <a:ext uri="{FF2B5EF4-FFF2-40B4-BE49-F238E27FC236}">
+                <a16:creationId xmlns:a16="http://schemas.microsoft.com/office/drawing/2014/main" id="{5AE468E7-738F-F34C-9D40-2C578BA20F32}"/>
               </a:ext>
             </a:extLst>
           </p:cNvPr>
@@ -5178,8 +5138,8 @@
         </p:nvSpPr>
         <p:spPr>
           <a:xfrm>
-            <a:off x="524933" y="5953017"/>
-            <a:ext cx="3352800" cy="369332"/>
+            <a:off x="524932" y="5953017"/>
+            <a:ext cx="2260309" cy="369332"/>
           </a:xfrm>
           <a:prstGeom prst="rect">
             <a:avLst/>
@@ -5194,16 +5154,805 @@
           <a:p>
             <a:r>
               <a:rPr lang="en-US" dirty="0" err="1"/>
-              <a:t>Gray_bordered</a:t>
-            </a:r>
-            <a:endParaRPr lang="en-US" dirty="0"/>
+              <a:t>Green_with_spot</a:t>
+            </a:r>
+            <a:r>
+              <a:rPr lang="en-US" dirty="0"/>
+              <a:t> _0</a:t>
+            </a:r>
+          </a:p>
+        </p:txBody>
+      </p:sp>
+      <p:sp>
+        <p:nvSpPr>
+          <p:cNvPr id="7" name="Oval 6">
+            <a:extLst>
+              <a:ext uri="{FF2B5EF4-FFF2-40B4-BE49-F238E27FC236}">
+                <a16:creationId xmlns:a16="http://schemas.microsoft.com/office/drawing/2014/main" id="{B13FA89C-DB57-D748-8C59-1E7CE13EB307}"/>
+              </a:ext>
+            </a:extLst>
+          </p:cNvPr>
+          <p:cNvSpPr/>
+          <p:nvPr/>
+        </p:nvSpPr>
+        <p:spPr>
+          <a:xfrm>
+            <a:off x="4659537" y="2485623"/>
+            <a:ext cx="1908687" cy="1893194"/>
+          </a:xfrm>
+          <a:prstGeom prst="ellipse">
+            <a:avLst/>
+          </a:prstGeom>
+          <a:solidFill>
+            <a:schemeClr val="bg2">
+              <a:alpha val="30000"/>
+            </a:schemeClr>
+          </a:solidFill>
+          <a:ln>
+            <a:noFill/>
+          </a:ln>
+        </p:spPr>
+        <p:style>
+          <a:lnRef idx="2">
+            <a:schemeClr val="accent1">
+              <a:shade val="50000"/>
+            </a:schemeClr>
+          </a:lnRef>
+          <a:fillRef idx="1">
+            <a:schemeClr val="accent1"/>
+          </a:fillRef>
+          <a:effectRef idx="0">
+            <a:schemeClr val="accent1"/>
+          </a:effectRef>
+          <a:fontRef idx="minor">
+            <a:schemeClr val="lt1"/>
+          </a:fontRef>
+        </p:style>
+        <p:txBody>
+          <a:bodyPr rtlCol="0" anchor="ctr"/>
+          <a:lstStyle/>
+          <a:p>
+            <a:pPr algn="ctr"/>
+            <a:endParaRPr lang="en-US"/>
           </a:p>
         </p:txBody>
       </p:sp>
     </p:spTree>
     <p:extLst>
       <p:ext uri="{BB962C8B-B14F-4D97-AF65-F5344CB8AC3E}">
-        <p14:creationId xmlns:p14="http://schemas.microsoft.com/office/powerpoint/2010/main" val="1632128921"/>
+        <p14:creationId xmlns:p14="http://schemas.microsoft.com/office/powerpoint/2010/main" val="1834447640"/>
+      </p:ext>
+    </p:extLst>
+  </p:cSld>
+  <p:clrMapOvr>
+    <a:masterClrMapping/>
+  </p:clrMapOvr>
+</p:sld>
+</file>
+
+<file path=ppt/slides/slide18.xml><?xml version="1.0" encoding="utf-8"?>
+<p:sld xmlns:a="http://schemas.openxmlformats.org/drawingml/2006/main" xmlns:r="http://schemas.openxmlformats.org/officeDocument/2006/relationships" xmlns:p="http://schemas.openxmlformats.org/presentationml/2006/main">
+  <p:cSld>
+    <p:spTree>
+      <p:nvGrpSpPr>
+        <p:cNvPr id="1" name=""/>
+        <p:cNvGrpSpPr/>
+        <p:nvPr/>
+      </p:nvGrpSpPr>
+      <p:grpSpPr>
+        <a:xfrm>
+          <a:off x="0" y="0"/>
+          <a:ext cx="0" cy="0"/>
+          <a:chOff x="0" y="0"/>
+          <a:chExt cx="0" cy="0"/>
+        </a:xfrm>
+      </p:grpSpPr>
+      <p:sp>
+        <p:nvSpPr>
+          <p:cNvPr id="4" name="Teardrop 3">
+            <a:extLst>
+              <a:ext uri="{FF2B5EF4-FFF2-40B4-BE49-F238E27FC236}">
+                <a16:creationId xmlns:a16="http://schemas.microsoft.com/office/drawing/2014/main" id="{C48761C1-1AC9-DC4A-9E0E-F050EE971F84}"/>
+              </a:ext>
+            </a:extLst>
+          </p:cNvPr>
+          <p:cNvSpPr/>
+          <p:nvPr/>
+        </p:nvSpPr>
+        <p:spPr>
+          <a:xfrm rot="8073567">
+            <a:off x="4046017" y="1910203"/>
+            <a:ext cx="3158524" cy="3087697"/>
+          </a:xfrm>
+          <a:prstGeom prst="teardrop">
+            <a:avLst>
+              <a:gd name="adj" fmla="val 134119"/>
+            </a:avLst>
+          </a:prstGeom>
+          <a:solidFill>
+            <a:schemeClr val="accent3">
+              <a:alpha val="80000"/>
+            </a:schemeClr>
+          </a:solidFill>
+          <a:ln w="203200">
+            <a:noFill/>
+          </a:ln>
+        </p:spPr>
+        <p:style>
+          <a:lnRef idx="2">
+            <a:schemeClr val="accent1">
+              <a:shade val="50000"/>
+            </a:schemeClr>
+          </a:lnRef>
+          <a:fillRef idx="1">
+            <a:schemeClr val="accent1"/>
+          </a:fillRef>
+          <a:effectRef idx="0">
+            <a:schemeClr val="accent1"/>
+          </a:effectRef>
+          <a:fontRef idx="minor">
+            <a:schemeClr val="lt1"/>
+          </a:fontRef>
+        </p:style>
+        <p:txBody>
+          <a:bodyPr rtlCol="0" anchor="ctr"/>
+          <a:lstStyle/>
+          <a:p>
+            <a:pPr algn="ctr"/>
+            <a:endParaRPr lang="en-US" dirty="0">
+              <a:solidFill>
+                <a:schemeClr val="bg2">
+                  <a:lumMod val="25000"/>
+                </a:schemeClr>
+              </a:solidFill>
+            </a:endParaRPr>
+          </a:p>
+        </p:txBody>
+      </p:sp>
+      <p:sp>
+        <p:nvSpPr>
+          <p:cNvPr id="2" name="TextBox 1">
+            <a:extLst>
+              <a:ext uri="{FF2B5EF4-FFF2-40B4-BE49-F238E27FC236}">
+                <a16:creationId xmlns:a16="http://schemas.microsoft.com/office/drawing/2014/main" id="{2C7A20DD-8BC2-924B-BC90-C75D9D4F87C4}"/>
+              </a:ext>
+            </a:extLst>
+          </p:cNvPr>
+          <p:cNvSpPr txBox="1"/>
+          <p:nvPr/>
+        </p:nvSpPr>
+        <p:spPr>
+          <a:xfrm>
+            <a:off x="524933" y="5953017"/>
+            <a:ext cx="3352800" cy="369332"/>
+          </a:xfrm>
+          <a:prstGeom prst="rect">
+            <a:avLst/>
+          </a:prstGeom>
+          <a:noFill/>
+        </p:spPr>
+        <p:txBody>
+          <a:bodyPr wrap="square" rtlCol="0">
+            <a:spAutoFit/>
+          </a:bodyPr>
+          <a:lstStyle/>
+          <a:p>
+            <a:r>
+              <a:rPr lang="en-US" dirty="0"/>
+              <a:t>Gray</a:t>
+            </a:r>
+          </a:p>
+        </p:txBody>
+      </p:sp>
+      <p:sp>
+        <p:nvSpPr>
+          <p:cNvPr id="5" name="Oval 4">
+            <a:extLst>
+              <a:ext uri="{FF2B5EF4-FFF2-40B4-BE49-F238E27FC236}">
+                <a16:creationId xmlns:a16="http://schemas.microsoft.com/office/drawing/2014/main" id="{D23C2DC4-B463-7B4A-B7E0-1882D472B210}"/>
+              </a:ext>
+            </a:extLst>
+          </p:cNvPr>
+          <p:cNvSpPr/>
+          <p:nvPr/>
+        </p:nvSpPr>
+        <p:spPr>
+          <a:xfrm>
+            <a:off x="4659537" y="2485623"/>
+            <a:ext cx="1908687" cy="1893194"/>
+          </a:xfrm>
+          <a:prstGeom prst="ellipse">
+            <a:avLst/>
+          </a:prstGeom>
+          <a:solidFill>
+            <a:schemeClr val="bg2">
+              <a:alpha val="30000"/>
+            </a:schemeClr>
+          </a:solidFill>
+          <a:ln>
+            <a:noFill/>
+          </a:ln>
+        </p:spPr>
+        <p:style>
+          <a:lnRef idx="2">
+            <a:schemeClr val="accent1">
+              <a:shade val="50000"/>
+            </a:schemeClr>
+          </a:lnRef>
+          <a:fillRef idx="1">
+            <a:schemeClr val="accent1"/>
+          </a:fillRef>
+          <a:effectRef idx="0">
+            <a:schemeClr val="accent1"/>
+          </a:effectRef>
+          <a:fontRef idx="minor">
+            <a:schemeClr val="lt1"/>
+          </a:fontRef>
+        </p:style>
+        <p:txBody>
+          <a:bodyPr rtlCol="0" anchor="ctr"/>
+          <a:lstStyle/>
+          <a:p>
+            <a:pPr algn="ctr"/>
+            <a:endParaRPr lang="en-US"/>
+          </a:p>
+        </p:txBody>
+      </p:sp>
+    </p:spTree>
+    <p:extLst>
+      <p:ext uri="{BB962C8B-B14F-4D97-AF65-F5344CB8AC3E}">
+        <p14:creationId xmlns:p14="http://schemas.microsoft.com/office/powerpoint/2010/main" val="1766476236"/>
+      </p:ext>
+    </p:extLst>
+  </p:cSld>
+  <p:clrMapOvr>
+    <a:masterClrMapping/>
+  </p:clrMapOvr>
+</p:sld>
+</file>
+
+<file path=ppt/slides/slide19.xml><?xml version="1.0" encoding="utf-8"?>
+<p:sld xmlns:a="http://schemas.openxmlformats.org/drawingml/2006/main" xmlns:r="http://schemas.openxmlformats.org/officeDocument/2006/relationships" xmlns:p="http://schemas.openxmlformats.org/presentationml/2006/main">
+  <p:cSld>
+    <p:spTree>
+      <p:nvGrpSpPr>
+        <p:cNvPr id="1" name=""/>
+        <p:cNvGrpSpPr/>
+        <p:nvPr/>
+      </p:nvGrpSpPr>
+      <p:grpSpPr>
+        <a:xfrm>
+          <a:off x="0" y="0"/>
+          <a:ext cx="0" cy="0"/>
+          <a:chOff x="0" y="0"/>
+          <a:chExt cx="0" cy="0"/>
+        </a:xfrm>
+      </p:grpSpPr>
+      <p:sp>
+        <p:nvSpPr>
+          <p:cNvPr id="3" name="TextBox 2">
+            <a:extLst>
+              <a:ext uri="{FF2B5EF4-FFF2-40B4-BE49-F238E27FC236}">
+                <a16:creationId xmlns:a16="http://schemas.microsoft.com/office/drawing/2014/main" id="{5AE468E7-738F-F34C-9D40-2C578BA20F32}"/>
+              </a:ext>
+            </a:extLst>
+          </p:cNvPr>
+          <p:cNvSpPr txBox="1"/>
+          <p:nvPr/>
+        </p:nvSpPr>
+        <p:spPr>
+          <a:xfrm>
+            <a:off x="524933" y="5953017"/>
+            <a:ext cx="1320800" cy="369332"/>
+          </a:xfrm>
+          <a:prstGeom prst="rect">
+            <a:avLst/>
+          </a:prstGeom>
+          <a:noFill/>
+        </p:spPr>
+        <p:txBody>
+          <a:bodyPr wrap="square" rtlCol="0">
+            <a:spAutoFit/>
+          </a:bodyPr>
+          <a:lstStyle/>
+          <a:p>
+            <a:r>
+              <a:rPr lang="en-US" dirty="0"/>
+              <a:t>stable</a:t>
+            </a:r>
+          </a:p>
+        </p:txBody>
+      </p:sp>
+      <p:sp>
+        <p:nvSpPr>
+          <p:cNvPr id="2" name="Right Arrow 1">
+            <a:extLst>
+              <a:ext uri="{FF2B5EF4-FFF2-40B4-BE49-F238E27FC236}">
+                <a16:creationId xmlns:a16="http://schemas.microsoft.com/office/drawing/2014/main" id="{4909111E-1708-3D43-87F2-FB37F53B3180}"/>
+              </a:ext>
+            </a:extLst>
+          </p:cNvPr>
+          <p:cNvSpPr/>
+          <p:nvPr/>
+        </p:nvSpPr>
+        <p:spPr>
+          <a:xfrm>
+            <a:off x="4317999" y="1574800"/>
+            <a:ext cx="4267200" cy="2929467"/>
+          </a:xfrm>
+          <a:prstGeom prst="rightArrow">
+            <a:avLst>
+              <a:gd name="adj1" fmla="val 24567"/>
+              <a:gd name="adj2" fmla="val 46328"/>
+            </a:avLst>
+          </a:prstGeom>
+          <a:solidFill>
+            <a:srgbClr val="FF0000"/>
+          </a:solidFill>
+          <a:ln>
+            <a:noFill/>
+          </a:ln>
+        </p:spPr>
+        <p:style>
+          <a:lnRef idx="2">
+            <a:schemeClr val="accent1">
+              <a:shade val="50000"/>
+            </a:schemeClr>
+          </a:lnRef>
+          <a:fillRef idx="1">
+            <a:schemeClr val="accent1"/>
+          </a:fillRef>
+          <a:effectRef idx="0">
+            <a:schemeClr val="accent1"/>
+          </a:effectRef>
+          <a:fontRef idx="minor">
+            <a:schemeClr val="lt1"/>
+          </a:fontRef>
+        </p:style>
+        <p:txBody>
+          <a:bodyPr rtlCol="0" anchor="ctr"/>
+          <a:lstStyle/>
+          <a:p>
+            <a:pPr algn="ctr"/>
+            <a:endParaRPr lang="en-US"/>
+          </a:p>
+        </p:txBody>
+      </p:sp>
+    </p:spTree>
+    <p:extLst>
+      <p:ext uri="{BB962C8B-B14F-4D97-AF65-F5344CB8AC3E}">
+        <p14:creationId xmlns:p14="http://schemas.microsoft.com/office/powerpoint/2010/main" val="536889346"/>
+      </p:ext>
+    </p:extLst>
+  </p:cSld>
+  <p:clrMapOvr>
+    <a:masterClrMapping/>
+  </p:clrMapOvr>
+</p:sld>
+</file>
+
+<file path=ppt/slides/slide2.xml><?xml version="1.0" encoding="utf-8"?>
+<p:sld xmlns:a="http://schemas.openxmlformats.org/drawingml/2006/main" xmlns:r="http://schemas.openxmlformats.org/officeDocument/2006/relationships" xmlns:p="http://schemas.openxmlformats.org/presentationml/2006/main">
+  <p:cSld>
+    <p:spTree>
+      <p:nvGrpSpPr>
+        <p:cNvPr id="1" name=""/>
+        <p:cNvGrpSpPr/>
+        <p:nvPr/>
+      </p:nvGrpSpPr>
+      <p:grpSpPr>
+        <a:xfrm>
+          <a:off x="0" y="0"/>
+          <a:ext cx="0" cy="0"/>
+          <a:chOff x="0" y="0"/>
+          <a:chExt cx="0" cy="0"/>
+        </a:xfrm>
+      </p:grpSpPr>
+      <p:sp>
+        <p:nvSpPr>
+          <p:cNvPr id="4" name="Teardrop 3">
+            <a:extLst>
+              <a:ext uri="{FF2B5EF4-FFF2-40B4-BE49-F238E27FC236}">
+                <a16:creationId xmlns:a16="http://schemas.microsoft.com/office/drawing/2014/main" id="{C48761C1-1AC9-DC4A-9E0E-F050EE971F84}"/>
+              </a:ext>
+            </a:extLst>
+          </p:cNvPr>
+          <p:cNvSpPr/>
+          <p:nvPr/>
+        </p:nvSpPr>
+        <p:spPr>
+          <a:xfrm rot="8073567">
+            <a:off x="4046017" y="1910203"/>
+            <a:ext cx="3158524" cy="3087697"/>
+          </a:xfrm>
+          <a:prstGeom prst="teardrop">
+            <a:avLst>
+              <a:gd name="adj" fmla="val 134119"/>
+            </a:avLst>
+          </a:prstGeom>
+          <a:solidFill>
+            <a:srgbClr val="2C6109"/>
+          </a:solidFill>
+          <a:ln>
+            <a:noFill/>
+          </a:ln>
+        </p:spPr>
+        <p:style>
+          <a:lnRef idx="2">
+            <a:schemeClr val="accent1">
+              <a:shade val="50000"/>
+            </a:schemeClr>
+          </a:lnRef>
+          <a:fillRef idx="1">
+            <a:schemeClr val="accent1"/>
+          </a:fillRef>
+          <a:effectRef idx="0">
+            <a:schemeClr val="accent1"/>
+          </a:effectRef>
+          <a:fontRef idx="minor">
+            <a:schemeClr val="lt1"/>
+          </a:fontRef>
+        </p:style>
+        <p:txBody>
+          <a:bodyPr rtlCol="0" anchor="ctr"/>
+          <a:lstStyle/>
+          <a:p>
+            <a:pPr algn="ctr"/>
+            <a:endParaRPr lang="en-US" dirty="0">
+              <a:solidFill>
+                <a:schemeClr val="bg2">
+                  <a:lumMod val="25000"/>
+                </a:schemeClr>
+              </a:solidFill>
+            </a:endParaRPr>
+          </a:p>
+        </p:txBody>
+      </p:sp>
+      <p:sp>
+        <p:nvSpPr>
+          <p:cNvPr id="2" name="TextBox 1">
+            <a:extLst>
+              <a:ext uri="{FF2B5EF4-FFF2-40B4-BE49-F238E27FC236}">
+                <a16:creationId xmlns:a16="http://schemas.microsoft.com/office/drawing/2014/main" id="{2C7A20DD-8BC2-924B-BC90-C75D9D4F87C4}"/>
+              </a:ext>
+            </a:extLst>
+          </p:cNvPr>
+          <p:cNvSpPr txBox="1"/>
+          <p:nvPr/>
+        </p:nvSpPr>
+        <p:spPr>
+          <a:xfrm>
+            <a:off x="524933" y="5953017"/>
+            <a:ext cx="1320800" cy="369332"/>
+          </a:xfrm>
+          <a:prstGeom prst="rect">
+            <a:avLst/>
+          </a:prstGeom>
+          <a:noFill/>
+        </p:spPr>
+        <p:txBody>
+          <a:bodyPr wrap="square" rtlCol="0">
+            <a:spAutoFit/>
+          </a:bodyPr>
+          <a:lstStyle/>
+          <a:p>
+            <a:r>
+              <a:rPr lang="en-US" dirty="0"/>
+              <a:t>Green_100</a:t>
+            </a:r>
+          </a:p>
+        </p:txBody>
+      </p:sp>
+    </p:spTree>
+    <p:extLst>
+      <p:ext uri="{BB962C8B-B14F-4D97-AF65-F5344CB8AC3E}">
+        <p14:creationId xmlns:p14="http://schemas.microsoft.com/office/powerpoint/2010/main" val="1779200348"/>
+      </p:ext>
+    </p:extLst>
+  </p:cSld>
+  <p:clrMapOvr>
+    <a:masterClrMapping/>
+  </p:clrMapOvr>
+</p:sld>
+</file>
+
+<file path=ppt/slides/slide20.xml><?xml version="1.0" encoding="utf-8"?>
+<p:sld xmlns:a="http://schemas.openxmlformats.org/drawingml/2006/main" xmlns:r="http://schemas.openxmlformats.org/officeDocument/2006/relationships" xmlns:p="http://schemas.openxmlformats.org/presentationml/2006/main">
+  <p:cSld>
+    <p:spTree>
+      <p:nvGrpSpPr>
+        <p:cNvPr id="1" name=""/>
+        <p:cNvGrpSpPr/>
+        <p:nvPr/>
+      </p:nvGrpSpPr>
+      <p:grpSpPr>
+        <a:xfrm>
+          <a:off x="0" y="0"/>
+          <a:ext cx="0" cy="0"/>
+          <a:chOff x="0" y="0"/>
+          <a:chExt cx="0" cy="0"/>
+        </a:xfrm>
+      </p:grpSpPr>
+      <p:sp>
+        <p:nvSpPr>
+          <p:cNvPr id="3" name="TextBox 2">
+            <a:extLst>
+              <a:ext uri="{FF2B5EF4-FFF2-40B4-BE49-F238E27FC236}">
+                <a16:creationId xmlns:a16="http://schemas.microsoft.com/office/drawing/2014/main" id="{5AE468E7-738F-F34C-9D40-2C578BA20F32}"/>
+              </a:ext>
+            </a:extLst>
+          </p:cNvPr>
+          <p:cNvSpPr txBox="1"/>
+          <p:nvPr/>
+        </p:nvSpPr>
+        <p:spPr>
+          <a:xfrm>
+            <a:off x="524933" y="5953017"/>
+            <a:ext cx="1320800" cy="369332"/>
+          </a:xfrm>
+          <a:prstGeom prst="rect">
+            <a:avLst/>
+          </a:prstGeom>
+          <a:noFill/>
+        </p:spPr>
+        <p:txBody>
+          <a:bodyPr wrap="square" rtlCol="0">
+            <a:spAutoFit/>
+          </a:bodyPr>
+          <a:lstStyle/>
+          <a:p>
+            <a:r>
+              <a:rPr lang="en-US" dirty="0"/>
+              <a:t>up</a:t>
+            </a:r>
+          </a:p>
+        </p:txBody>
+      </p:sp>
+      <p:sp>
+        <p:nvSpPr>
+          <p:cNvPr id="2" name="Right Arrow 1">
+            <a:extLst>
+              <a:ext uri="{FF2B5EF4-FFF2-40B4-BE49-F238E27FC236}">
+                <a16:creationId xmlns:a16="http://schemas.microsoft.com/office/drawing/2014/main" id="{4909111E-1708-3D43-87F2-FB37F53B3180}"/>
+              </a:ext>
+            </a:extLst>
+          </p:cNvPr>
+          <p:cNvSpPr/>
+          <p:nvPr/>
+        </p:nvSpPr>
+        <p:spPr>
+          <a:xfrm rot="18772169">
+            <a:off x="4317999" y="1574800"/>
+            <a:ext cx="4267200" cy="2929467"/>
+          </a:xfrm>
+          <a:prstGeom prst="rightArrow">
+            <a:avLst>
+              <a:gd name="adj1" fmla="val 24567"/>
+              <a:gd name="adj2" fmla="val 46328"/>
+            </a:avLst>
+          </a:prstGeom>
+          <a:solidFill>
+            <a:srgbClr val="FF0000"/>
+          </a:solidFill>
+          <a:ln>
+            <a:noFill/>
+          </a:ln>
+        </p:spPr>
+        <p:style>
+          <a:lnRef idx="2">
+            <a:schemeClr val="accent1">
+              <a:shade val="50000"/>
+            </a:schemeClr>
+          </a:lnRef>
+          <a:fillRef idx="1">
+            <a:schemeClr val="accent1"/>
+          </a:fillRef>
+          <a:effectRef idx="0">
+            <a:schemeClr val="accent1"/>
+          </a:effectRef>
+          <a:fontRef idx="minor">
+            <a:schemeClr val="lt1"/>
+          </a:fontRef>
+        </p:style>
+        <p:txBody>
+          <a:bodyPr rtlCol="0" anchor="ctr"/>
+          <a:lstStyle/>
+          <a:p>
+            <a:pPr algn="ctr"/>
+            <a:endParaRPr lang="en-US"/>
+          </a:p>
+        </p:txBody>
+      </p:sp>
+    </p:spTree>
+    <p:extLst>
+      <p:ext uri="{BB962C8B-B14F-4D97-AF65-F5344CB8AC3E}">
+        <p14:creationId xmlns:p14="http://schemas.microsoft.com/office/powerpoint/2010/main" val="4058273542"/>
+      </p:ext>
+    </p:extLst>
+  </p:cSld>
+  <p:clrMapOvr>
+    <a:masterClrMapping/>
+  </p:clrMapOvr>
+</p:sld>
+</file>
+
+<file path=ppt/slides/slide21.xml><?xml version="1.0" encoding="utf-8"?>
+<p:sld xmlns:a="http://schemas.openxmlformats.org/drawingml/2006/main" xmlns:r="http://schemas.openxmlformats.org/officeDocument/2006/relationships" xmlns:p="http://schemas.openxmlformats.org/presentationml/2006/main">
+  <p:cSld>
+    <p:spTree>
+      <p:nvGrpSpPr>
+        <p:cNvPr id="1" name=""/>
+        <p:cNvGrpSpPr/>
+        <p:nvPr/>
+      </p:nvGrpSpPr>
+      <p:grpSpPr>
+        <a:xfrm>
+          <a:off x="0" y="0"/>
+          <a:ext cx="0" cy="0"/>
+          <a:chOff x="0" y="0"/>
+          <a:chExt cx="0" cy="0"/>
+        </a:xfrm>
+      </p:grpSpPr>
+      <p:sp>
+        <p:nvSpPr>
+          <p:cNvPr id="3" name="TextBox 2">
+            <a:extLst>
+              <a:ext uri="{FF2B5EF4-FFF2-40B4-BE49-F238E27FC236}">
+                <a16:creationId xmlns:a16="http://schemas.microsoft.com/office/drawing/2014/main" id="{5AE468E7-738F-F34C-9D40-2C578BA20F32}"/>
+              </a:ext>
+            </a:extLst>
+          </p:cNvPr>
+          <p:cNvSpPr txBox="1"/>
+          <p:nvPr/>
+        </p:nvSpPr>
+        <p:spPr>
+          <a:xfrm>
+            <a:off x="524933" y="5953017"/>
+            <a:ext cx="1320800" cy="369332"/>
+          </a:xfrm>
+          <a:prstGeom prst="rect">
+            <a:avLst/>
+          </a:prstGeom>
+          <a:noFill/>
+        </p:spPr>
+        <p:txBody>
+          <a:bodyPr wrap="square" rtlCol="0">
+            <a:spAutoFit/>
+          </a:bodyPr>
+          <a:lstStyle/>
+          <a:p>
+            <a:r>
+              <a:rPr lang="en-US" dirty="0"/>
+              <a:t>down</a:t>
+            </a:r>
+          </a:p>
+        </p:txBody>
+      </p:sp>
+      <p:sp>
+        <p:nvSpPr>
+          <p:cNvPr id="2" name="Right Arrow 1">
+            <a:extLst>
+              <a:ext uri="{FF2B5EF4-FFF2-40B4-BE49-F238E27FC236}">
+                <a16:creationId xmlns:a16="http://schemas.microsoft.com/office/drawing/2014/main" id="{4909111E-1708-3D43-87F2-FB37F53B3180}"/>
+              </a:ext>
+            </a:extLst>
+          </p:cNvPr>
+          <p:cNvSpPr/>
+          <p:nvPr/>
+        </p:nvSpPr>
+        <p:spPr>
+          <a:xfrm rot="2833537">
+            <a:off x="4317999" y="1574800"/>
+            <a:ext cx="4267200" cy="2929467"/>
+          </a:xfrm>
+          <a:prstGeom prst="rightArrow">
+            <a:avLst>
+              <a:gd name="adj1" fmla="val 24567"/>
+              <a:gd name="adj2" fmla="val 46328"/>
+            </a:avLst>
+          </a:prstGeom>
+          <a:solidFill>
+            <a:srgbClr val="FF0000"/>
+          </a:solidFill>
+          <a:ln>
+            <a:noFill/>
+          </a:ln>
+        </p:spPr>
+        <p:style>
+          <a:lnRef idx="2">
+            <a:schemeClr val="accent1">
+              <a:shade val="50000"/>
+            </a:schemeClr>
+          </a:lnRef>
+          <a:fillRef idx="1">
+            <a:schemeClr val="accent1"/>
+          </a:fillRef>
+          <a:effectRef idx="0">
+            <a:schemeClr val="accent1"/>
+          </a:effectRef>
+          <a:fontRef idx="minor">
+            <a:schemeClr val="lt1"/>
+          </a:fontRef>
+        </p:style>
+        <p:txBody>
+          <a:bodyPr rtlCol="0" anchor="ctr"/>
+          <a:lstStyle/>
+          <a:p>
+            <a:pPr algn="ctr"/>
+            <a:endParaRPr lang="en-US"/>
+          </a:p>
+        </p:txBody>
+      </p:sp>
+    </p:spTree>
+    <p:extLst>
+      <p:ext uri="{BB962C8B-B14F-4D97-AF65-F5344CB8AC3E}">
+        <p14:creationId xmlns:p14="http://schemas.microsoft.com/office/powerpoint/2010/main" val="1226917232"/>
+      </p:ext>
+    </p:extLst>
+  </p:cSld>
+  <p:clrMapOvr>
+    <a:masterClrMapping/>
+  </p:clrMapOvr>
+</p:sld>
+</file>
+
+<file path=ppt/slides/slide22.xml><?xml version="1.0" encoding="utf-8"?>
+<p:sld xmlns:a="http://schemas.openxmlformats.org/drawingml/2006/main" xmlns:r="http://schemas.openxmlformats.org/officeDocument/2006/relationships" xmlns:p="http://schemas.openxmlformats.org/presentationml/2006/main">
+  <p:cSld>
+    <p:spTree>
+      <p:nvGrpSpPr>
+        <p:cNvPr id="1" name=""/>
+        <p:cNvGrpSpPr/>
+        <p:nvPr/>
+      </p:nvGrpSpPr>
+      <p:grpSpPr>
+        <a:xfrm>
+          <a:off x="0" y="0"/>
+          <a:ext cx="0" cy="0"/>
+          <a:chOff x="0" y="0"/>
+          <a:chExt cx="0" cy="0"/>
+        </a:xfrm>
+      </p:grpSpPr>
+      <p:pic>
+        <p:nvPicPr>
+          <p:cNvPr id="7" name="Graphic 6" descr="Leaf">
+            <a:extLst>
+              <a:ext uri="{FF2B5EF4-FFF2-40B4-BE49-F238E27FC236}">
+                <a16:creationId xmlns:a16="http://schemas.microsoft.com/office/drawing/2014/main" id="{8C056B41-EECA-5240-BE3A-1FA5DDC41657}"/>
+              </a:ext>
+            </a:extLst>
+          </p:cNvPr>
+          <p:cNvPicPr>
+            <a:picLocks noChangeAspect="1"/>
+          </p:cNvPicPr>
+          <p:nvPr/>
+        </p:nvPicPr>
+        <p:blipFill>
+          <a:blip r:embed="rId2">
+            <a:extLst>
+              <a:ext uri="{96DAC541-7B7A-43D3-8B79-37D633B846F1}">
+                <asvg:svgBlip xmlns:asvg="http://schemas.microsoft.com/office/drawing/2016/SVG/main" r:embed="rId3"/>
+              </a:ext>
+            </a:extLst>
+          </a:blip>
+          <a:stretch>
+            <a:fillRect/>
+          </a:stretch>
+        </p:blipFill>
+        <p:spPr>
+          <a:xfrm>
+            <a:off x="3843866" y="1270001"/>
+            <a:ext cx="3937000" cy="3937000"/>
+          </a:xfrm>
+          <a:prstGeom prst="rect">
+            <a:avLst/>
+          </a:prstGeom>
+        </p:spPr>
+      </p:pic>
+    </p:spTree>
+    <p:extLst>
+      <p:ext uri="{BB962C8B-B14F-4D97-AF65-F5344CB8AC3E}">
+        <p14:creationId xmlns:p14="http://schemas.microsoft.com/office/powerpoint/2010/main" val="1931095479"/>
       </p:ext>
     </p:extLst>
   </p:cSld>
@@ -5253,14 +6002,10 @@
             </a:avLst>
           </a:prstGeom>
           <a:solidFill>
-            <a:srgbClr val="2C6109">
-              <a:alpha val="90000"/>
-            </a:srgbClr>
+            <a:srgbClr val="4D7B1B"/>
           </a:solidFill>
-          <a:ln w="203200">
-            <a:solidFill>
-              <a:schemeClr val="accent4"/>
-            </a:solidFill>
+          <a:ln>
+            <a:noFill/>
           </a:ln>
         </p:spPr>
         <p:style>
@@ -5296,10 +6041,10 @@
       </p:sp>
       <p:sp>
         <p:nvSpPr>
-          <p:cNvPr id="2" name="TextBox 1">
-            <a:extLst>
-              <a:ext uri="{FF2B5EF4-FFF2-40B4-BE49-F238E27FC236}">
-                <a16:creationId xmlns:a16="http://schemas.microsoft.com/office/drawing/2014/main" id="{2C7A20DD-8BC2-924B-BC90-C75D9D4F87C4}"/>
+          <p:cNvPr id="3" name="TextBox 2">
+            <a:extLst>
+              <a:ext uri="{FF2B5EF4-FFF2-40B4-BE49-F238E27FC236}">
+                <a16:creationId xmlns:a16="http://schemas.microsoft.com/office/drawing/2014/main" id="{B6A86C8F-8A19-6C45-BB85-0F5C83220264}"/>
               </a:ext>
             </a:extLst>
           </p:cNvPr>
@@ -5309,7 +6054,7 @@
         <p:spPr>
           <a:xfrm>
             <a:off x="524933" y="5953017"/>
-            <a:ext cx="3352800" cy="369332"/>
+            <a:ext cx="1320800" cy="369332"/>
           </a:xfrm>
           <a:prstGeom prst="rect">
             <a:avLst/>
@@ -5324,7 +6069,7 @@
           <a:p>
             <a:r>
               <a:rPr lang="en-US" dirty="0"/>
-              <a:t>Green_100_bordered</a:t>
+              <a:t>Green_75</a:t>
             </a:r>
           </a:p>
         </p:txBody>
@@ -5332,7 +6077,7 @@
     </p:spTree>
     <p:extLst>
       <p:ext uri="{BB962C8B-B14F-4D97-AF65-F5344CB8AC3E}">
-        <p14:creationId xmlns:p14="http://schemas.microsoft.com/office/powerpoint/2010/main" val="2528312527"/>
+        <p14:creationId xmlns:p14="http://schemas.microsoft.com/office/powerpoint/2010/main" val="2333445821"/>
       </p:ext>
     </p:extLst>
   </p:cSld>
@@ -5382,12 +6127,10 @@
             </a:avLst>
           </a:prstGeom>
           <a:solidFill>
-            <a:srgbClr val="4D7B1B"/>
+            <a:srgbClr val="6E9624"/>
           </a:solidFill>
-          <a:ln w="203200">
-            <a:solidFill>
-              <a:schemeClr val="accent4"/>
-            </a:solidFill>
+          <a:ln>
+            <a:noFill/>
           </a:ln>
         </p:spPr>
         <p:style>
@@ -5426,7 +6169,7 @@
           <p:cNvPr id="3" name="TextBox 2">
             <a:extLst>
               <a:ext uri="{FF2B5EF4-FFF2-40B4-BE49-F238E27FC236}">
-                <a16:creationId xmlns:a16="http://schemas.microsoft.com/office/drawing/2014/main" id="{B6A86C8F-8A19-6C45-BB85-0F5C83220264}"/>
+                <a16:creationId xmlns:a16="http://schemas.microsoft.com/office/drawing/2014/main" id="{7C1F9DF5-B920-1547-8A25-F1D9B352E7FB}"/>
               </a:ext>
             </a:extLst>
           </p:cNvPr>
@@ -5435,8 +6178,8 @@
         </p:nvSpPr>
         <p:spPr>
           <a:xfrm>
-            <a:off x="524932" y="5953017"/>
-            <a:ext cx="2892231" cy="369332"/>
+            <a:off x="524933" y="5953017"/>
+            <a:ext cx="1320800" cy="369332"/>
           </a:xfrm>
           <a:prstGeom prst="rect">
             <a:avLst/>
@@ -5451,7 +6194,7 @@
           <a:p>
             <a:r>
               <a:rPr lang="en-US" dirty="0"/>
-              <a:t>Green_with_75_bordered</a:t>
+              <a:t>Green_50</a:t>
             </a:r>
           </a:p>
         </p:txBody>
@@ -5459,7 +6202,7 @@
     </p:spTree>
     <p:extLst>
       <p:ext uri="{BB962C8B-B14F-4D97-AF65-F5344CB8AC3E}">
-        <p14:creationId xmlns:p14="http://schemas.microsoft.com/office/powerpoint/2010/main" val="2463057175"/>
+        <p14:creationId xmlns:p14="http://schemas.microsoft.com/office/powerpoint/2010/main" val="3256539429"/>
       </p:ext>
     </p:extLst>
   </p:cSld>
@@ -5509,12 +6252,10 @@
             </a:avLst>
           </a:prstGeom>
           <a:solidFill>
-            <a:srgbClr val="6E9624"/>
+            <a:srgbClr val="67B946"/>
           </a:solidFill>
-          <a:ln w="203200">
-            <a:solidFill>
-              <a:schemeClr val="accent4"/>
-            </a:solidFill>
+          <a:ln>
+            <a:noFill/>
           </a:ln>
         </p:spPr>
         <p:style>
@@ -5553,7 +6294,7 @@
           <p:cNvPr id="3" name="TextBox 2">
             <a:extLst>
               <a:ext uri="{FF2B5EF4-FFF2-40B4-BE49-F238E27FC236}">
-                <a16:creationId xmlns:a16="http://schemas.microsoft.com/office/drawing/2014/main" id="{7C1F9DF5-B920-1547-8A25-F1D9B352E7FB}"/>
+                <a16:creationId xmlns:a16="http://schemas.microsoft.com/office/drawing/2014/main" id="{1C488C69-D820-1546-B381-ABC2900F4EA4}"/>
               </a:ext>
             </a:extLst>
           </p:cNvPr>
@@ -5562,8 +6303,8 @@
         </p:nvSpPr>
         <p:spPr>
           <a:xfrm>
-            <a:off x="524932" y="5953017"/>
-            <a:ext cx="2892231" cy="369332"/>
+            <a:off x="524933" y="5953017"/>
+            <a:ext cx="1320800" cy="369332"/>
           </a:xfrm>
           <a:prstGeom prst="rect">
             <a:avLst/>
@@ -5577,12 +6318,8 @@
           <a:lstStyle/>
           <a:p>
             <a:r>
-              <a:rPr lang="en-US" dirty="0" err="1"/>
-              <a:t>Green_with_border</a:t>
-            </a:r>
-            <a:r>
               <a:rPr lang="en-US" dirty="0"/>
-              <a:t> _50</a:t>
+              <a:t>Green_25</a:t>
             </a:r>
           </a:p>
         </p:txBody>
@@ -5590,7 +6327,7 @@
     </p:spTree>
     <p:extLst>
       <p:ext uri="{BB962C8B-B14F-4D97-AF65-F5344CB8AC3E}">
-        <p14:creationId xmlns:p14="http://schemas.microsoft.com/office/powerpoint/2010/main" val="3694608347"/>
+        <p14:creationId xmlns:p14="http://schemas.microsoft.com/office/powerpoint/2010/main" val="2806290532"/>
       </p:ext>
     </p:extLst>
   </p:cSld>
@@ -5640,12 +6377,10 @@
             </a:avLst>
           </a:prstGeom>
           <a:solidFill>
-            <a:srgbClr val="67B946"/>
+            <a:srgbClr val="C5DC68"/>
           </a:solidFill>
-          <a:ln w="203200">
-            <a:solidFill>
-              <a:schemeClr val="accent4"/>
-            </a:solidFill>
+          <a:ln>
+            <a:noFill/>
           </a:ln>
         </p:spPr>
         <p:style>
@@ -5684,7 +6419,7 @@
           <p:cNvPr id="3" name="TextBox 2">
             <a:extLst>
               <a:ext uri="{FF2B5EF4-FFF2-40B4-BE49-F238E27FC236}">
-                <a16:creationId xmlns:a16="http://schemas.microsoft.com/office/drawing/2014/main" id="{1C488C69-D820-1546-B381-ABC2900F4EA4}"/>
+                <a16:creationId xmlns:a16="http://schemas.microsoft.com/office/drawing/2014/main" id="{5AE468E7-738F-F34C-9D40-2C578BA20F32}"/>
               </a:ext>
             </a:extLst>
           </p:cNvPr>
@@ -5693,8 +6428,8 @@
         </p:nvSpPr>
         <p:spPr>
           <a:xfrm>
-            <a:off x="524932" y="5953017"/>
-            <a:ext cx="3031067" cy="369332"/>
+            <a:off x="524933" y="5953017"/>
+            <a:ext cx="1320800" cy="369332"/>
           </a:xfrm>
           <a:prstGeom prst="rect">
             <a:avLst/>
@@ -5708,12 +6443,8 @@
           <a:lstStyle/>
           <a:p>
             <a:r>
-              <a:rPr lang="en-US" dirty="0" err="1"/>
-              <a:t>Green_with_border</a:t>
-            </a:r>
-            <a:r>
               <a:rPr lang="en-US" dirty="0"/>
-              <a:t> _25</a:t>
+              <a:t>Green_0</a:t>
             </a:r>
           </a:p>
         </p:txBody>
@@ -5721,7 +6452,7 @@
     </p:spTree>
     <p:extLst>
       <p:ext uri="{BB962C8B-B14F-4D97-AF65-F5344CB8AC3E}">
-        <p14:creationId xmlns:p14="http://schemas.microsoft.com/office/powerpoint/2010/main" val="13841306"/>
+        <p14:creationId xmlns:p14="http://schemas.microsoft.com/office/powerpoint/2010/main" val="2340571402"/>
       </p:ext>
     </p:extLst>
   </p:cSld>
@@ -5734,6 +6465,14 @@
 <file path=ppt/slides/slide7.xml><?xml version="1.0" encoding="utf-8"?>
 <p:sld xmlns:a="http://schemas.openxmlformats.org/drawingml/2006/main" xmlns:r="http://schemas.openxmlformats.org/officeDocument/2006/relationships" xmlns:p="http://schemas.openxmlformats.org/presentationml/2006/main">
   <p:cSld>
+    <p:bg>
+      <p:bgPr>
+        <a:solidFill>
+          <a:schemeClr val="bg1"/>
+        </a:solidFill>
+        <a:effectLst/>
+      </p:bgPr>
+    </p:bg>
     <p:spTree>
       <p:nvGrpSpPr>
         <p:cNvPr id="1" name=""/>
@@ -5771,7 +6510,7 @@
             </a:avLst>
           </a:prstGeom>
           <a:solidFill>
-            <a:srgbClr val="C5DC68"/>
+            <a:schemeClr val="accent3"/>
           </a:solidFill>
           <a:ln w="203200">
             <a:solidFill>
@@ -5812,10 +6551,10 @@
       </p:sp>
       <p:sp>
         <p:nvSpPr>
-          <p:cNvPr id="3" name="TextBox 2">
-            <a:extLst>
-              <a:ext uri="{FF2B5EF4-FFF2-40B4-BE49-F238E27FC236}">
-                <a16:creationId xmlns:a16="http://schemas.microsoft.com/office/drawing/2014/main" id="{5AE468E7-738F-F34C-9D40-2C578BA20F32}"/>
+          <p:cNvPr id="2" name="TextBox 1">
+            <a:extLst>
+              <a:ext uri="{FF2B5EF4-FFF2-40B4-BE49-F238E27FC236}">
+                <a16:creationId xmlns:a16="http://schemas.microsoft.com/office/drawing/2014/main" id="{2C7A20DD-8BC2-924B-BC90-C75D9D4F87C4}"/>
               </a:ext>
             </a:extLst>
           </p:cNvPr>
@@ -5824,8 +6563,8 @@
         </p:nvSpPr>
         <p:spPr>
           <a:xfrm>
-            <a:off x="524932" y="5953017"/>
-            <a:ext cx="2624667" cy="369332"/>
+            <a:off x="524933" y="5953017"/>
+            <a:ext cx="3352800" cy="369332"/>
           </a:xfrm>
           <a:prstGeom prst="rect">
             <a:avLst/>
@@ -5840,19 +6579,16 @@
           <a:p>
             <a:r>
               <a:rPr lang="en-US" dirty="0" err="1"/>
-              <a:t>Green_with_border</a:t>
-            </a:r>
-            <a:r>
-              <a:rPr lang="en-US" dirty="0"/>
-              <a:t> _0</a:t>
-            </a:r>
+              <a:t>Gray_bordered</a:t>
+            </a:r>
+            <a:endParaRPr lang="en-US" dirty="0"/>
           </a:p>
         </p:txBody>
       </p:sp>
     </p:spTree>
     <p:extLst>
       <p:ext uri="{BB962C8B-B14F-4D97-AF65-F5344CB8AC3E}">
-        <p14:creationId xmlns:p14="http://schemas.microsoft.com/office/powerpoint/2010/main" val="3243478862"/>
+        <p14:creationId xmlns:p14="http://schemas.microsoft.com/office/powerpoint/2010/main" val="1632128921"/>
       </p:ext>
     </p:extLst>
   </p:cSld>
@@ -5902,10 +6638,14 @@
             </a:avLst>
           </a:prstGeom>
           <a:solidFill>
-            <a:srgbClr val="2C6109"/>
+            <a:srgbClr val="2C6109">
+              <a:alpha val="90000"/>
+            </a:srgbClr>
           </a:solidFill>
-          <a:ln>
-            <a:noFill/>
+          <a:ln w="203200">
+            <a:solidFill>
+              <a:schemeClr val="accent4"/>
+            </a:solidFill>
           </a:ln>
         </p:spPr>
         <p:style>
@@ -5953,8 +6693,8 @@
         </p:nvSpPr>
         <p:spPr>
           <a:xfrm>
-            <a:off x="524932" y="5953017"/>
-            <a:ext cx="2453045" cy="369332"/>
+            <a:off x="524933" y="5953017"/>
+            <a:ext cx="3352800" cy="369332"/>
           </a:xfrm>
           <a:prstGeom prst="rect">
             <a:avLst/>
@@ -5969,69 +6709,15 @@
           <a:p>
             <a:r>
               <a:rPr lang="en-US" dirty="0"/>
-              <a:t>Green_with_spot_100</a:t>
-            </a:r>
-          </a:p>
-        </p:txBody>
-      </p:sp>
-      <p:sp>
-        <p:nvSpPr>
-          <p:cNvPr id="3" name="Oval 2">
-            <a:extLst>
-              <a:ext uri="{FF2B5EF4-FFF2-40B4-BE49-F238E27FC236}">
-                <a16:creationId xmlns:a16="http://schemas.microsoft.com/office/drawing/2014/main" id="{95F14A4A-32C9-C948-A1AC-032BEAB256FF}"/>
-              </a:ext>
-            </a:extLst>
-          </p:cNvPr>
-          <p:cNvSpPr/>
-          <p:nvPr/>
-        </p:nvSpPr>
-        <p:spPr>
-          <a:xfrm>
-            <a:off x="4659537" y="2485623"/>
-            <a:ext cx="1908687" cy="1893194"/>
-          </a:xfrm>
-          <a:prstGeom prst="ellipse">
-            <a:avLst/>
-          </a:prstGeom>
-          <a:solidFill>
-            <a:schemeClr val="bg2">
-              <a:alpha val="10000"/>
-            </a:schemeClr>
-          </a:solidFill>
-          <a:ln>
-            <a:noFill/>
-          </a:ln>
-        </p:spPr>
-        <p:style>
-          <a:lnRef idx="2">
-            <a:schemeClr val="accent1">
-              <a:shade val="50000"/>
-            </a:schemeClr>
-          </a:lnRef>
-          <a:fillRef idx="1">
-            <a:schemeClr val="accent1"/>
-          </a:fillRef>
-          <a:effectRef idx="0">
-            <a:schemeClr val="accent1"/>
-          </a:effectRef>
-          <a:fontRef idx="minor">
-            <a:schemeClr val="lt1"/>
-          </a:fontRef>
-        </p:style>
-        <p:txBody>
-          <a:bodyPr rtlCol="0" anchor="ctr"/>
-          <a:lstStyle/>
-          <a:p>
-            <a:pPr algn="ctr"/>
-            <a:endParaRPr lang="en-US"/>
+              <a:t>Green_100_bordered</a:t>
+            </a:r>
           </a:p>
         </p:txBody>
       </p:sp>
     </p:spTree>
     <p:extLst>
       <p:ext uri="{BB962C8B-B14F-4D97-AF65-F5344CB8AC3E}">
-        <p14:creationId xmlns:p14="http://schemas.microsoft.com/office/powerpoint/2010/main" val="1215715211"/>
+        <p14:creationId xmlns:p14="http://schemas.microsoft.com/office/powerpoint/2010/main" val="2528312527"/>
       </p:ext>
     </p:extLst>
   </p:cSld>
@@ -6083,8 +6769,10 @@
           <a:solidFill>
             <a:srgbClr val="4D7B1B"/>
           </a:solidFill>
-          <a:ln>
-            <a:noFill/>
+          <a:ln w="203200">
+            <a:solidFill>
+              <a:schemeClr val="accent4"/>
+            </a:solidFill>
           </a:ln>
         </p:spPr>
         <p:style>
@@ -6147,74 +6835,16 @@
           <a:lstStyle/>
           <a:p>
             <a:r>
-              <a:rPr lang="en-US" dirty="0" err="1"/>
-              <a:t>Green_with_spot</a:t>
-            </a:r>
-            <a:r>
               <a:rPr lang="en-US" dirty="0"/>
-              <a:t> _75</a:t>
-            </a:r>
-          </a:p>
-        </p:txBody>
-      </p:sp>
-      <p:sp>
-        <p:nvSpPr>
-          <p:cNvPr id="8" name="Oval 7">
-            <a:extLst>
-              <a:ext uri="{FF2B5EF4-FFF2-40B4-BE49-F238E27FC236}">
-                <a16:creationId xmlns:a16="http://schemas.microsoft.com/office/drawing/2014/main" id="{3BB9DC39-5C68-8A4D-A5BD-DB78063FE8E7}"/>
-              </a:ext>
-            </a:extLst>
-          </p:cNvPr>
-          <p:cNvSpPr/>
-          <p:nvPr/>
-        </p:nvSpPr>
-        <p:spPr>
-          <a:xfrm>
-            <a:off x="4659537" y="2485623"/>
-            <a:ext cx="1908687" cy="1893194"/>
-          </a:xfrm>
-          <a:prstGeom prst="ellipse">
-            <a:avLst/>
-          </a:prstGeom>
-          <a:solidFill>
-            <a:schemeClr val="bg2">
-              <a:alpha val="10000"/>
-            </a:schemeClr>
-          </a:solidFill>
-          <a:ln>
-            <a:noFill/>
-          </a:ln>
-        </p:spPr>
-        <p:style>
-          <a:lnRef idx="2">
-            <a:schemeClr val="accent1">
-              <a:shade val="50000"/>
-            </a:schemeClr>
-          </a:lnRef>
-          <a:fillRef idx="1">
-            <a:schemeClr val="accent1"/>
-          </a:fillRef>
-          <a:effectRef idx="0">
-            <a:schemeClr val="accent1"/>
-          </a:effectRef>
-          <a:fontRef idx="minor">
-            <a:schemeClr val="lt1"/>
-          </a:fontRef>
-        </p:style>
-        <p:txBody>
-          <a:bodyPr rtlCol="0" anchor="ctr"/>
-          <a:lstStyle/>
-          <a:p>
-            <a:pPr algn="ctr"/>
-            <a:endParaRPr lang="en-US"/>
+              <a:t>Green_with_75_bordered</a:t>
+            </a:r>
           </a:p>
         </p:txBody>
       </p:sp>
     </p:spTree>
     <p:extLst>
       <p:ext uri="{BB962C8B-B14F-4D97-AF65-F5344CB8AC3E}">
-        <p14:creationId xmlns:p14="http://schemas.microsoft.com/office/powerpoint/2010/main" val="166912252"/>
+        <p14:creationId xmlns:p14="http://schemas.microsoft.com/office/powerpoint/2010/main" val="2463057175"/>
       </p:ext>
     </p:extLst>
   </p:cSld>

</xml_diff>